<commit_message>
Drawing layouts for each singleton
</commit_message>
<xml_diff>
--- a/Misc/wikipedia_rcc8_figure.pptx
+++ b/Misc/wikipedia_rcc8_figure.pptx
@@ -11,8 +11,8 @@
     <p:sldId id="259" r:id="rId5"/>
     <p:sldId id="260" r:id="rId6"/>
     <p:sldId id="261" r:id="rId7"/>
-    <p:sldId id="262" r:id="rId8"/>
-    <p:sldId id="263" r:id="rId9"/>
+    <p:sldId id="263" r:id="rId8"/>
+    <p:sldId id="262" r:id="rId9"/>
     <p:sldId id="264" r:id="rId10"/>
     <p:sldId id="265" r:id="rId11"/>
     <p:sldId id="266" r:id="rId12"/>
@@ -16107,7 +16107,7 @@
         </p:nvGrpSpPr>
         <p:grpSpPr>
           <a:xfrm>
-            <a:off x="3234497" y="2037403"/>
+            <a:off x="980897" y="2037403"/>
             <a:ext cx="5523046" cy="3556127"/>
             <a:chOff x="3234497" y="2037403"/>
             <a:chExt cx="5523046" cy="3556127"/>
@@ -17496,6 +17496,266 @@
           </p:txBody>
         </p:sp>
       </p:grpSp>
+      <p:sp>
+        <p:nvSpPr>
+          <p:cNvPr id="11" name="Rectangle 10">
+            <a:extLst>
+              <a:ext uri="{FF2B5EF4-FFF2-40B4-BE49-F238E27FC236}">
+                <a16:creationId xmlns:a16="http://schemas.microsoft.com/office/drawing/2014/main" id="{BE0B314F-0FAC-884C-BC15-8AF21F5F28BB}"/>
+              </a:ext>
+            </a:extLst>
+          </p:cNvPr>
+          <p:cNvSpPr/>
+          <p:nvPr/>
+        </p:nvSpPr>
+        <p:spPr>
+          <a:xfrm>
+            <a:off x="7388010" y="2997940"/>
+            <a:ext cx="1719692" cy="1533099"/>
+          </a:xfrm>
+          <a:prstGeom prst="rect">
+            <a:avLst/>
+          </a:prstGeom>
+          <a:solidFill>
+            <a:srgbClr val="C5E0B4">
+              <a:alpha val="50196"/>
+            </a:srgbClr>
+          </a:solidFill>
+        </p:spPr>
+        <p:style>
+          <a:lnRef idx="2">
+            <a:schemeClr val="dk1"/>
+          </a:lnRef>
+          <a:fillRef idx="1">
+            <a:schemeClr val="lt1"/>
+          </a:fillRef>
+          <a:effectRef idx="0">
+            <a:schemeClr val="dk1"/>
+          </a:effectRef>
+          <a:fontRef idx="minor">
+            <a:schemeClr val="dk1"/>
+          </a:fontRef>
+        </p:style>
+        <p:txBody>
+          <a:bodyPr rtlCol="0" anchor="t" anchorCtr="0"/>
+          <a:lstStyle/>
+          <a:p>
+            <a:pPr algn="ctr"/>
+            <a:r>
+              <a:rPr lang="en-US" dirty="0"/>
+              <a:t>Property1</a:t>
+            </a:r>
+          </a:p>
+        </p:txBody>
+      </p:sp>
+      <p:sp>
+        <p:nvSpPr>
+          <p:cNvPr id="40" name="Rectangle 39">
+            <a:extLst>
+              <a:ext uri="{FF2B5EF4-FFF2-40B4-BE49-F238E27FC236}">
+                <a16:creationId xmlns:a16="http://schemas.microsoft.com/office/drawing/2014/main" id="{5C737FDA-C2C9-BB47-B003-156D429FBCBA}"/>
+              </a:ext>
+            </a:extLst>
+          </p:cNvPr>
+          <p:cNvSpPr/>
+          <p:nvPr/>
+        </p:nvSpPr>
+        <p:spPr>
+          <a:xfrm>
+            <a:off x="9103423" y="2813303"/>
+            <a:ext cx="1719692" cy="1533099"/>
+          </a:xfrm>
+          <a:prstGeom prst="rect">
+            <a:avLst/>
+          </a:prstGeom>
+          <a:solidFill>
+            <a:srgbClr val="F4B183">
+              <a:alpha val="50196"/>
+            </a:srgbClr>
+          </a:solidFill>
+        </p:spPr>
+        <p:style>
+          <a:lnRef idx="2">
+            <a:schemeClr val="dk1"/>
+          </a:lnRef>
+          <a:fillRef idx="1">
+            <a:schemeClr val="lt1"/>
+          </a:fillRef>
+          <a:effectRef idx="0">
+            <a:schemeClr val="dk1"/>
+          </a:effectRef>
+          <a:fontRef idx="minor">
+            <a:schemeClr val="dk1"/>
+          </a:fontRef>
+        </p:style>
+        <p:txBody>
+          <a:bodyPr rtlCol="0" anchor="t" anchorCtr="0"/>
+          <a:lstStyle/>
+          <a:p>
+            <a:pPr algn="ctr"/>
+            <a:r>
+              <a:rPr lang="en-US" dirty="0"/>
+              <a:t>Property2</a:t>
+            </a:r>
+          </a:p>
+        </p:txBody>
+      </p:sp>
+      <p:sp>
+        <p:nvSpPr>
+          <p:cNvPr id="43" name="Rectangle 42">
+            <a:extLst>
+              <a:ext uri="{FF2B5EF4-FFF2-40B4-BE49-F238E27FC236}">
+                <a16:creationId xmlns:a16="http://schemas.microsoft.com/office/drawing/2014/main" id="{9663BE20-A6C8-C34D-B427-E0E32620EC66}"/>
+              </a:ext>
+            </a:extLst>
+          </p:cNvPr>
+          <p:cNvSpPr/>
+          <p:nvPr/>
+        </p:nvSpPr>
+        <p:spPr>
+          <a:xfrm>
+            <a:off x="8184593" y="3487964"/>
+            <a:ext cx="918829" cy="621598"/>
+          </a:xfrm>
+          <a:prstGeom prst="rect">
+            <a:avLst/>
+          </a:prstGeom>
+          <a:solidFill>
+            <a:srgbClr val="548235">
+              <a:alpha val="50196"/>
+            </a:srgbClr>
+          </a:solidFill>
+        </p:spPr>
+        <p:style>
+          <a:lnRef idx="2">
+            <a:schemeClr val="dk1"/>
+          </a:lnRef>
+          <a:fillRef idx="1">
+            <a:schemeClr val="lt1"/>
+          </a:fillRef>
+          <a:effectRef idx="0">
+            <a:schemeClr val="dk1"/>
+          </a:effectRef>
+          <a:fontRef idx="minor">
+            <a:schemeClr val="dk1"/>
+          </a:fontRef>
+        </p:style>
+        <p:txBody>
+          <a:bodyPr rtlCol="0" anchor="ctr" anchorCtr="0"/>
+          <a:lstStyle/>
+          <a:p>
+            <a:pPr algn="ctr"/>
+            <a:r>
+              <a:rPr lang="en-US" dirty="0"/>
+              <a:t>House1</a:t>
+            </a:r>
+          </a:p>
+        </p:txBody>
+      </p:sp>
+      <p:sp>
+        <p:nvSpPr>
+          <p:cNvPr id="49" name="Rectangle 48">
+            <a:extLst>
+              <a:ext uri="{FF2B5EF4-FFF2-40B4-BE49-F238E27FC236}">
+                <a16:creationId xmlns:a16="http://schemas.microsoft.com/office/drawing/2014/main" id="{AF1A500A-A3F5-F844-99BE-A3396AE52DA9}"/>
+              </a:ext>
+            </a:extLst>
+          </p:cNvPr>
+          <p:cNvSpPr/>
+          <p:nvPr/>
+        </p:nvSpPr>
+        <p:spPr>
+          <a:xfrm>
+            <a:off x="9532354" y="3303327"/>
+            <a:ext cx="918829" cy="621598"/>
+          </a:xfrm>
+          <a:prstGeom prst="rect">
+            <a:avLst/>
+          </a:prstGeom>
+          <a:solidFill>
+            <a:srgbClr val="C55A11">
+              <a:alpha val="50196"/>
+            </a:srgbClr>
+          </a:solidFill>
+        </p:spPr>
+        <p:style>
+          <a:lnRef idx="2">
+            <a:schemeClr val="dk1"/>
+          </a:lnRef>
+          <a:fillRef idx="1">
+            <a:schemeClr val="lt1"/>
+          </a:fillRef>
+          <a:effectRef idx="0">
+            <a:schemeClr val="dk1"/>
+          </a:effectRef>
+          <a:fontRef idx="minor">
+            <a:schemeClr val="dk1"/>
+          </a:fontRef>
+        </p:style>
+        <p:txBody>
+          <a:bodyPr rtlCol="0" anchor="ctr" anchorCtr="0"/>
+          <a:lstStyle/>
+          <a:p>
+            <a:pPr algn="ctr"/>
+            <a:r>
+              <a:rPr lang="en-US" dirty="0"/>
+              <a:t>House2</a:t>
+            </a:r>
+          </a:p>
+        </p:txBody>
+      </p:sp>
+      <p:sp>
+        <p:nvSpPr>
+          <p:cNvPr id="59" name="Rectangle 58">
+            <a:extLst>
+              <a:ext uri="{FF2B5EF4-FFF2-40B4-BE49-F238E27FC236}">
+                <a16:creationId xmlns:a16="http://schemas.microsoft.com/office/drawing/2014/main" id="{D68C9CF6-B6FB-A84B-8E76-B244B23E2638}"/>
+              </a:ext>
+            </a:extLst>
+          </p:cNvPr>
+          <p:cNvSpPr/>
+          <p:nvPr/>
+        </p:nvSpPr>
+        <p:spPr>
+          <a:xfrm>
+            <a:off x="6975231" y="4220240"/>
+            <a:ext cx="4378569" cy="621598"/>
+          </a:xfrm>
+          <a:prstGeom prst="rect">
+            <a:avLst/>
+          </a:prstGeom>
+          <a:solidFill>
+            <a:srgbClr val="BFBFBF">
+              <a:alpha val="50196"/>
+            </a:srgbClr>
+          </a:solidFill>
+        </p:spPr>
+        <p:style>
+          <a:lnRef idx="2">
+            <a:schemeClr val="dk1"/>
+          </a:lnRef>
+          <a:fillRef idx="1">
+            <a:schemeClr val="lt1"/>
+          </a:fillRef>
+          <a:effectRef idx="0">
+            <a:schemeClr val="dk1"/>
+          </a:effectRef>
+          <a:fontRef idx="minor">
+            <a:schemeClr val="dk1"/>
+          </a:fontRef>
+        </p:style>
+        <p:txBody>
+          <a:bodyPr rtlCol="0" anchor="b" anchorCtr="0"/>
+          <a:lstStyle/>
+          <a:p>
+            <a:pPr algn="ctr"/>
+            <a:r>
+              <a:rPr lang="en-US" dirty="0"/>
+              <a:t>Road</a:t>
+            </a:r>
+          </a:p>
+        </p:txBody>
+      </p:sp>
     </p:spTree>
     <p:extLst>
       <p:ext uri="{BB962C8B-B14F-4D97-AF65-F5344CB8AC3E}">
@@ -17510,6 +17770,1735 @@
 </file>
 
 <file path=ppt/slides/slide7.xml><?xml version="1.0" encoding="utf-8"?>
+<p:sld xmlns:a="http://schemas.openxmlformats.org/drawingml/2006/main" xmlns:r="http://schemas.openxmlformats.org/officeDocument/2006/relationships" xmlns:p="http://schemas.openxmlformats.org/presentationml/2006/main">
+  <p:cSld>
+    <p:spTree>
+      <p:nvGrpSpPr>
+        <p:cNvPr id="1" name=""/>
+        <p:cNvGrpSpPr/>
+        <p:nvPr/>
+      </p:nvGrpSpPr>
+      <p:grpSpPr>
+        <a:xfrm>
+          <a:off x="0" y="0"/>
+          <a:ext cx="0" cy="0"/>
+          <a:chOff x="0" y="0"/>
+          <a:chExt cx="0" cy="0"/>
+        </a:xfrm>
+      </p:grpSpPr>
+      <p:sp>
+        <p:nvSpPr>
+          <p:cNvPr id="4" name="Title 3">
+            <a:extLst>
+              <a:ext uri="{FF2B5EF4-FFF2-40B4-BE49-F238E27FC236}">
+                <a16:creationId xmlns:a16="http://schemas.microsoft.com/office/drawing/2014/main" id="{D13A5089-35DD-B546-B3E4-9466511D7438}"/>
+              </a:ext>
+            </a:extLst>
+          </p:cNvPr>
+          <p:cNvSpPr>
+            <a:spLocks noGrp="1"/>
+          </p:cNvSpPr>
+          <p:nvPr>
+            <p:ph type="title"/>
+          </p:nvPr>
+        </p:nvSpPr>
+        <p:spPr/>
+        <p:txBody>
+          <a:bodyPr/>
+          <a:lstStyle/>
+          <a:p>
+            <a:pPr algn="ctr"/>
+            <a:r>
+              <a:rPr lang="en-US" dirty="0"/>
+              <a:t>Wikipedia’s RCC-8 Example:</a:t>
+            </a:r>
+            <a:br>
+              <a:rPr lang="en-US" dirty="0"/>
+            </a:br>
+            <a:r>
+              <a:rPr lang="en-US" dirty="0"/>
+              <a:t>Singleton Labeling #3</a:t>
+            </a:r>
+          </a:p>
+        </p:txBody>
+      </p:sp>
+      <p:grpSp>
+        <p:nvGrpSpPr>
+          <p:cNvPr id="3" name="Group 2">
+            <a:extLst>
+              <a:ext uri="{FF2B5EF4-FFF2-40B4-BE49-F238E27FC236}">
+                <a16:creationId xmlns:a16="http://schemas.microsoft.com/office/drawing/2014/main" id="{21AA4B19-95B4-AD46-A9F2-2AE2832F2420}"/>
+              </a:ext>
+            </a:extLst>
+          </p:cNvPr>
+          <p:cNvGrpSpPr/>
+          <p:nvPr/>
+        </p:nvGrpSpPr>
+        <p:grpSpPr>
+          <a:xfrm>
+            <a:off x="1052287" y="2037403"/>
+            <a:ext cx="5523046" cy="3556127"/>
+            <a:chOff x="3223987" y="2037403"/>
+            <a:chExt cx="5523046" cy="3556127"/>
+          </a:xfrm>
+        </p:grpSpPr>
+        <p:grpSp>
+          <p:nvGrpSpPr>
+            <p:cNvPr id="2" name="Group 1">
+              <a:extLst>
+                <a:ext uri="{FF2B5EF4-FFF2-40B4-BE49-F238E27FC236}">
+                  <a16:creationId xmlns:a16="http://schemas.microsoft.com/office/drawing/2014/main" id="{85F47D7A-B529-7B40-8AE4-31C373330188}"/>
+                </a:ext>
+              </a:extLst>
+            </p:cNvPr>
+            <p:cNvGrpSpPr/>
+            <p:nvPr/>
+          </p:nvGrpSpPr>
+          <p:grpSpPr>
+            <a:xfrm>
+              <a:off x="3223987" y="2037403"/>
+              <a:ext cx="5523046" cy="3556127"/>
+              <a:chOff x="3223987" y="2037403"/>
+              <a:chExt cx="5523046" cy="3556127"/>
+            </a:xfrm>
+          </p:grpSpPr>
+          <p:cxnSp>
+            <p:nvCxnSpPr>
+              <p:cNvPr id="14" name="Straight Arrow Connector 13">
+                <a:extLst>
+                  <a:ext uri="{FF2B5EF4-FFF2-40B4-BE49-F238E27FC236}">
+                    <a16:creationId xmlns:a16="http://schemas.microsoft.com/office/drawing/2014/main" id="{E124D229-6D19-AD48-BE0C-2FF3078B703C}"/>
+                  </a:ext>
+                </a:extLst>
+              </p:cNvPr>
+              <p:cNvCxnSpPr>
+                <a:cxnSpLocks/>
+              </p:cNvCxnSpPr>
+              <p:nvPr/>
+            </p:nvCxnSpPr>
+            <p:spPr>
+              <a:xfrm flipV="1">
+                <a:off x="4496307" y="3847841"/>
+                <a:ext cx="2978404" cy="1525752"/>
+              </a:xfrm>
+              <a:prstGeom prst="straightConnector1">
+                <a:avLst/>
+              </a:prstGeom>
+              <a:ln w="38100">
+                <a:solidFill>
+                  <a:schemeClr val="tx1"/>
+                </a:solidFill>
+                <a:headEnd type="none" w="med" len="med"/>
+                <a:tailEnd type="triangle" w="med" len="med"/>
+              </a:ln>
+            </p:spPr>
+            <p:style>
+              <a:lnRef idx="1">
+                <a:schemeClr val="accent1"/>
+              </a:lnRef>
+              <a:fillRef idx="0">
+                <a:schemeClr val="accent1"/>
+              </a:fillRef>
+              <a:effectRef idx="0">
+                <a:schemeClr val="accent1"/>
+              </a:effectRef>
+              <a:fontRef idx="minor">
+                <a:schemeClr val="tx1"/>
+              </a:fontRef>
+            </p:style>
+          </p:cxnSp>
+          <p:cxnSp>
+            <p:nvCxnSpPr>
+              <p:cNvPr id="12" name="Straight Arrow Connector 11">
+                <a:extLst>
+                  <a:ext uri="{FF2B5EF4-FFF2-40B4-BE49-F238E27FC236}">
+                    <a16:creationId xmlns:a16="http://schemas.microsoft.com/office/drawing/2014/main" id="{202A615F-5239-F442-8AA1-09AA3EABAA34}"/>
+                  </a:ext>
+                </a:extLst>
+              </p:cNvPr>
+              <p:cNvCxnSpPr>
+                <a:stCxn id="5" idx="3"/>
+                <a:endCxn id="8" idx="1"/>
+              </p:cNvCxnSpPr>
+              <p:nvPr/>
+            </p:nvCxnSpPr>
+            <p:spPr>
+              <a:xfrm flipV="1">
+                <a:off x="5132468" y="5358819"/>
+                <a:ext cx="1706083" cy="14775"/>
+              </a:xfrm>
+              <a:prstGeom prst="straightConnector1">
+                <a:avLst/>
+              </a:prstGeom>
+              <a:ln w="38100">
+                <a:solidFill>
+                  <a:schemeClr val="tx1"/>
+                </a:solidFill>
+                <a:headEnd type="none" w="med" len="med"/>
+                <a:tailEnd type="triangle" w="med" len="med"/>
+              </a:ln>
+            </p:spPr>
+            <p:style>
+              <a:lnRef idx="1">
+                <a:schemeClr val="accent1"/>
+              </a:lnRef>
+              <a:fillRef idx="0">
+                <a:schemeClr val="accent1"/>
+              </a:fillRef>
+              <a:effectRef idx="0">
+                <a:schemeClr val="accent1"/>
+              </a:effectRef>
+              <a:fontRef idx="minor">
+                <a:schemeClr val="tx1"/>
+              </a:fontRef>
+            </p:style>
+          </p:cxnSp>
+          <p:cxnSp>
+            <p:nvCxnSpPr>
+              <p:cNvPr id="13" name="Straight Arrow Connector 12">
+                <a:extLst>
+                  <a:ext uri="{FF2B5EF4-FFF2-40B4-BE49-F238E27FC236}">
+                    <a16:creationId xmlns:a16="http://schemas.microsoft.com/office/drawing/2014/main" id="{03E3D434-9237-4C47-8552-FEA99A54B4AC}"/>
+                  </a:ext>
+                </a:extLst>
+              </p:cNvPr>
+              <p:cNvCxnSpPr>
+                <a:cxnSpLocks/>
+                <a:endCxn id="7" idx="2"/>
+              </p:cNvCxnSpPr>
+              <p:nvPr/>
+            </p:nvCxnSpPr>
+            <p:spPr>
+              <a:xfrm flipH="1" flipV="1">
+                <a:off x="3860148" y="3878409"/>
+                <a:ext cx="636159" cy="1495184"/>
+              </a:xfrm>
+              <a:prstGeom prst="straightConnector1">
+                <a:avLst/>
+              </a:prstGeom>
+              <a:ln w="38100">
+                <a:solidFill>
+                  <a:schemeClr val="tx1"/>
+                </a:solidFill>
+                <a:headEnd type="none" w="med" len="med"/>
+                <a:tailEnd type="triangle" w="med" len="med"/>
+              </a:ln>
+            </p:spPr>
+            <p:style>
+              <a:lnRef idx="1">
+                <a:schemeClr val="accent1"/>
+              </a:lnRef>
+              <a:fillRef idx="0">
+                <a:schemeClr val="accent1"/>
+              </a:fillRef>
+              <a:effectRef idx="0">
+                <a:schemeClr val="accent1"/>
+              </a:effectRef>
+              <a:fontRef idx="minor">
+                <a:schemeClr val="tx1"/>
+              </a:fontRef>
+            </p:style>
+          </p:cxnSp>
+          <p:cxnSp>
+            <p:nvCxnSpPr>
+              <p:cNvPr id="29" name="Straight Arrow Connector 28">
+                <a:extLst>
+                  <a:ext uri="{FF2B5EF4-FFF2-40B4-BE49-F238E27FC236}">
+                    <a16:creationId xmlns:a16="http://schemas.microsoft.com/office/drawing/2014/main" id="{1A8962DC-CEB3-0D4C-A07B-40AC50BDC47E}"/>
+                  </a:ext>
+                </a:extLst>
+              </p:cNvPr>
+              <p:cNvCxnSpPr>
+                <a:cxnSpLocks/>
+                <a:endCxn id="9" idx="2"/>
+              </p:cNvCxnSpPr>
+              <p:nvPr/>
+            </p:nvCxnSpPr>
+            <p:spPr>
+              <a:xfrm flipV="1">
+                <a:off x="7474711" y="3884587"/>
+                <a:ext cx="636162" cy="1443663"/>
+              </a:xfrm>
+              <a:prstGeom prst="straightConnector1">
+                <a:avLst/>
+              </a:prstGeom>
+              <a:ln w="38100">
+                <a:solidFill>
+                  <a:schemeClr val="tx1"/>
+                </a:solidFill>
+                <a:headEnd type="none" w="med" len="med"/>
+                <a:tailEnd type="triangle" w="med" len="med"/>
+              </a:ln>
+            </p:spPr>
+            <p:style>
+              <a:lnRef idx="1">
+                <a:schemeClr val="accent1"/>
+              </a:lnRef>
+              <a:fillRef idx="0">
+                <a:schemeClr val="accent1"/>
+              </a:fillRef>
+              <a:effectRef idx="0">
+                <a:schemeClr val="accent1"/>
+              </a:effectRef>
+              <a:fontRef idx="minor">
+                <a:schemeClr val="tx1"/>
+              </a:fontRef>
+            </p:style>
+          </p:cxnSp>
+          <p:cxnSp>
+            <p:nvCxnSpPr>
+              <p:cNvPr id="38" name="Straight Arrow Connector 37">
+                <a:extLst>
+                  <a:ext uri="{FF2B5EF4-FFF2-40B4-BE49-F238E27FC236}">
+                    <a16:creationId xmlns:a16="http://schemas.microsoft.com/office/drawing/2014/main" id="{FC395F21-FE9B-294B-8D1C-F675C64D1646}"/>
+                  </a:ext>
+                </a:extLst>
+              </p:cNvPr>
+              <p:cNvCxnSpPr>
+                <a:cxnSpLocks/>
+                <a:stCxn id="7" idx="3"/>
+                <a:endCxn id="9" idx="1"/>
+              </p:cNvCxnSpPr>
+              <p:nvPr/>
+            </p:nvCxnSpPr>
+            <p:spPr>
+              <a:xfrm>
+                <a:off x="4496308" y="3658473"/>
+                <a:ext cx="2978404" cy="6178"/>
+              </a:xfrm>
+              <a:prstGeom prst="straightConnector1">
+                <a:avLst/>
+              </a:prstGeom>
+              <a:ln w="38100">
+                <a:solidFill>
+                  <a:schemeClr val="tx1"/>
+                </a:solidFill>
+                <a:headEnd type="none" w="med" len="med"/>
+                <a:tailEnd type="triangle" w="med" len="med"/>
+              </a:ln>
+            </p:spPr>
+            <p:style>
+              <a:lnRef idx="1">
+                <a:schemeClr val="accent1"/>
+              </a:lnRef>
+              <a:fillRef idx="0">
+                <a:schemeClr val="accent1"/>
+              </a:fillRef>
+              <a:effectRef idx="0">
+                <a:schemeClr val="accent1"/>
+              </a:effectRef>
+              <a:fontRef idx="minor">
+                <a:schemeClr val="tx1"/>
+              </a:fontRef>
+            </p:style>
+          </p:cxnSp>
+          <p:cxnSp>
+            <p:nvCxnSpPr>
+              <p:cNvPr id="41" name="Straight Arrow Connector 40">
+                <a:extLst>
+                  <a:ext uri="{FF2B5EF4-FFF2-40B4-BE49-F238E27FC236}">
+                    <a16:creationId xmlns:a16="http://schemas.microsoft.com/office/drawing/2014/main" id="{EA9B8247-B563-2C47-98E1-B9CAE5F8A5EE}"/>
+                  </a:ext>
+                </a:extLst>
+              </p:cNvPr>
+              <p:cNvCxnSpPr>
+                <a:cxnSpLocks/>
+              </p:cNvCxnSpPr>
+              <p:nvPr/>
+            </p:nvCxnSpPr>
+            <p:spPr>
+              <a:xfrm flipH="1">
+                <a:off x="3860147" y="2467282"/>
+                <a:ext cx="1491260" cy="1226051"/>
+              </a:xfrm>
+              <a:prstGeom prst="straightConnector1">
+                <a:avLst/>
+              </a:prstGeom>
+              <a:ln w="38100">
+                <a:solidFill>
+                  <a:schemeClr val="tx1"/>
+                </a:solidFill>
+                <a:headEnd type="triangle" w="med" len="med"/>
+                <a:tailEnd type="none" w="med" len="med"/>
+              </a:ln>
+            </p:spPr>
+            <p:style>
+              <a:lnRef idx="1">
+                <a:schemeClr val="accent1"/>
+              </a:lnRef>
+              <a:fillRef idx="0">
+                <a:schemeClr val="accent1"/>
+              </a:fillRef>
+              <a:effectRef idx="0">
+                <a:schemeClr val="accent1"/>
+              </a:effectRef>
+              <a:fontRef idx="minor">
+                <a:schemeClr val="tx1"/>
+              </a:fontRef>
+            </p:style>
+          </p:cxnSp>
+          <p:cxnSp>
+            <p:nvCxnSpPr>
+              <p:cNvPr id="42" name="Straight Arrow Connector 41">
+                <a:extLst>
+                  <a:ext uri="{FF2B5EF4-FFF2-40B4-BE49-F238E27FC236}">
+                    <a16:creationId xmlns:a16="http://schemas.microsoft.com/office/drawing/2014/main" id="{AA7D0DEA-BA78-754D-914C-A56B3E3FEA7B}"/>
+                  </a:ext>
+                </a:extLst>
+              </p:cNvPr>
+              <p:cNvCxnSpPr>
+                <a:cxnSpLocks/>
+              </p:cNvCxnSpPr>
+              <p:nvPr/>
+            </p:nvCxnSpPr>
+            <p:spPr>
+              <a:xfrm>
+                <a:off x="6593508" y="2476320"/>
+                <a:ext cx="1527845" cy="1211929"/>
+              </a:xfrm>
+              <a:prstGeom prst="straightConnector1">
+                <a:avLst/>
+              </a:prstGeom>
+              <a:ln w="38100">
+                <a:solidFill>
+                  <a:schemeClr val="tx1"/>
+                </a:solidFill>
+                <a:headEnd type="triangle" w="med" len="med"/>
+                <a:tailEnd type="none" w="med" len="med"/>
+              </a:ln>
+            </p:spPr>
+            <p:style>
+              <a:lnRef idx="1">
+                <a:schemeClr val="accent1"/>
+              </a:lnRef>
+              <a:fillRef idx="0">
+                <a:schemeClr val="accent1"/>
+              </a:fillRef>
+              <a:effectRef idx="0">
+                <a:schemeClr val="accent1"/>
+              </a:effectRef>
+              <a:fontRef idx="minor">
+                <a:schemeClr val="tx1"/>
+              </a:fontRef>
+            </p:style>
+          </p:cxnSp>
+          <p:sp>
+            <p:nvSpPr>
+              <p:cNvPr id="10" name="Rounded Rectangle 9">
+                <a:extLst>
+                  <a:ext uri="{FF2B5EF4-FFF2-40B4-BE49-F238E27FC236}">
+                    <a16:creationId xmlns:a16="http://schemas.microsoft.com/office/drawing/2014/main" id="{9665DD76-FB60-9949-A2BC-E3AE99E193A3}"/>
+                  </a:ext>
+                </a:extLst>
+              </p:cNvPr>
+              <p:cNvSpPr/>
+              <p:nvPr/>
+            </p:nvSpPr>
+            <p:spPr>
+              <a:xfrm>
+                <a:off x="5349349" y="2037403"/>
+                <a:ext cx="1272321" cy="439873"/>
+              </a:xfrm>
+              <a:prstGeom prst="roundRect">
+                <a:avLst/>
+              </a:prstGeom>
+              <a:ln w="38100"/>
+            </p:spPr>
+            <p:style>
+              <a:lnRef idx="2">
+                <a:schemeClr val="dk1"/>
+              </a:lnRef>
+              <a:fillRef idx="1">
+                <a:schemeClr val="lt1"/>
+              </a:fillRef>
+              <a:effectRef idx="0">
+                <a:schemeClr val="dk1"/>
+              </a:effectRef>
+              <a:fontRef idx="minor">
+                <a:schemeClr val="dk1"/>
+              </a:fontRef>
+            </p:style>
+            <p:txBody>
+              <a:bodyPr rtlCol="0" anchor="ctr"/>
+              <a:lstStyle/>
+              <a:p>
+                <a:pPr algn="ctr"/>
+                <a:r>
+                  <a:rPr lang="en-US" dirty="0"/>
+                  <a:t>Road</a:t>
+                </a:r>
+              </a:p>
+            </p:txBody>
+          </p:sp>
+          <p:sp>
+            <p:nvSpPr>
+              <p:cNvPr id="50" name="TextBox 49">
+                <a:extLst>
+                  <a:ext uri="{FF2B5EF4-FFF2-40B4-BE49-F238E27FC236}">
+                    <a16:creationId xmlns:a16="http://schemas.microsoft.com/office/drawing/2014/main" id="{EF191CAD-2B0E-634D-91AC-44C037F9E1A9}"/>
+                  </a:ext>
+                </a:extLst>
+              </p:cNvPr>
+              <p:cNvSpPr txBox="1"/>
+              <p:nvPr/>
+            </p:nvSpPr>
+            <p:spPr>
+              <a:xfrm>
+                <a:off x="5258690" y="5024335"/>
+                <a:ext cx="450764" cy="369332"/>
+              </a:xfrm>
+              <a:prstGeom prst="rect">
+                <a:avLst/>
+              </a:prstGeom>
+              <a:noFill/>
+            </p:spPr>
+            <p:txBody>
+              <a:bodyPr wrap="none" rtlCol="0">
+                <a:spAutoFit/>
+              </a:bodyPr>
+              <a:lstStyle/>
+              <a:p>
+                <a:r>
+                  <a:rPr lang="en-US" dirty="0"/>
+                  <a:t>DC</a:t>
+                </a:r>
+              </a:p>
+            </p:txBody>
+          </p:sp>
+          <p:sp>
+            <p:nvSpPr>
+              <p:cNvPr id="51" name="TextBox 50">
+                <a:extLst>
+                  <a:ext uri="{FF2B5EF4-FFF2-40B4-BE49-F238E27FC236}">
+                    <a16:creationId xmlns:a16="http://schemas.microsoft.com/office/drawing/2014/main" id="{BE157556-26C9-8446-9152-BE8EED6ECA40}"/>
+                  </a:ext>
+                </a:extLst>
+              </p:cNvPr>
+              <p:cNvSpPr txBox="1"/>
+              <p:nvPr/>
+            </p:nvSpPr>
+            <p:spPr>
+              <a:xfrm>
+                <a:off x="3467973" y="4553403"/>
+                <a:ext cx="534121" cy="369332"/>
+              </a:xfrm>
+              <a:prstGeom prst="rect">
+                <a:avLst/>
+              </a:prstGeom>
+              <a:noFill/>
+            </p:spPr>
+            <p:txBody>
+              <a:bodyPr wrap="none" rtlCol="0">
+                <a:spAutoFit/>
+              </a:bodyPr>
+              <a:lstStyle/>
+              <a:p>
+                <a:r>
+                  <a:rPr lang="en-US" dirty="0">
+                    <a:solidFill>
+                      <a:srgbClr val="FF0000"/>
+                    </a:solidFill>
+                  </a:rPr>
+                  <a:t>TPP</a:t>
+                </a:r>
+              </a:p>
+            </p:txBody>
+          </p:sp>
+          <p:sp>
+            <p:nvSpPr>
+              <p:cNvPr id="52" name="TextBox 51">
+                <a:extLst>
+                  <a:ext uri="{FF2B5EF4-FFF2-40B4-BE49-F238E27FC236}">
+                    <a16:creationId xmlns:a16="http://schemas.microsoft.com/office/drawing/2014/main" id="{0548B6EC-FFCF-B846-9DD8-A27CCCA2B1DA}"/>
+                  </a:ext>
+                </a:extLst>
+              </p:cNvPr>
+              <p:cNvSpPr txBox="1"/>
+              <p:nvPr/>
+            </p:nvSpPr>
+            <p:spPr>
+              <a:xfrm rot="19966229">
+                <a:off x="5074607" y="4570329"/>
+                <a:ext cx="417615" cy="369332"/>
+              </a:xfrm>
+              <a:prstGeom prst="rect">
+                <a:avLst/>
+              </a:prstGeom>
+              <a:noFill/>
+            </p:spPr>
+            <p:txBody>
+              <a:bodyPr wrap="none" rtlCol="0">
+                <a:spAutoFit/>
+              </a:bodyPr>
+              <a:lstStyle/>
+              <a:p>
+                <a:r>
+                  <a:rPr lang="en-US" dirty="0">
+                    <a:solidFill>
+                      <a:srgbClr val="FF0000"/>
+                    </a:solidFill>
+                  </a:rPr>
+                  <a:t>EC</a:t>
+                </a:r>
+              </a:p>
+            </p:txBody>
+          </p:sp>
+          <p:sp>
+            <p:nvSpPr>
+              <p:cNvPr id="53" name="TextBox 52">
+                <a:extLst>
+                  <a:ext uri="{FF2B5EF4-FFF2-40B4-BE49-F238E27FC236}">
+                    <a16:creationId xmlns:a16="http://schemas.microsoft.com/office/drawing/2014/main" id="{46D38238-221A-A54A-86AA-AF0AED500DB4}"/>
+                  </a:ext>
+                </a:extLst>
+              </p:cNvPr>
+              <p:cNvSpPr txBox="1"/>
+              <p:nvPr/>
+            </p:nvSpPr>
+            <p:spPr>
+              <a:xfrm>
+                <a:off x="4413123" y="4500895"/>
+                <a:ext cx="417615" cy="369332"/>
+              </a:xfrm>
+              <a:prstGeom prst="rect">
+                <a:avLst/>
+              </a:prstGeom>
+              <a:noFill/>
+            </p:spPr>
+            <p:txBody>
+              <a:bodyPr wrap="none" rtlCol="0">
+                <a:spAutoFit/>
+              </a:bodyPr>
+              <a:lstStyle/>
+              <a:p>
+                <a:r>
+                  <a:rPr lang="en-US" dirty="0"/>
+                  <a:t>EC</a:t>
+                </a:r>
+              </a:p>
+            </p:txBody>
+          </p:sp>
+          <p:sp>
+            <p:nvSpPr>
+              <p:cNvPr id="54" name="TextBox 53">
+                <a:extLst>
+                  <a:ext uri="{FF2B5EF4-FFF2-40B4-BE49-F238E27FC236}">
+                    <a16:creationId xmlns:a16="http://schemas.microsoft.com/office/drawing/2014/main" id="{3CC797EB-7D55-6D4D-B7BC-C2A989BF3E68}"/>
+                  </a:ext>
+                </a:extLst>
+              </p:cNvPr>
+              <p:cNvSpPr txBox="1"/>
+              <p:nvPr/>
+            </p:nvSpPr>
+            <p:spPr>
+              <a:xfrm>
+                <a:off x="5746970" y="3292471"/>
+                <a:ext cx="417615" cy="369332"/>
+              </a:xfrm>
+              <a:prstGeom prst="rect">
+                <a:avLst/>
+              </a:prstGeom>
+              <a:noFill/>
+            </p:spPr>
+            <p:txBody>
+              <a:bodyPr wrap="none" rtlCol="0">
+                <a:spAutoFit/>
+              </a:bodyPr>
+              <a:lstStyle/>
+              <a:p>
+                <a:r>
+                  <a:rPr lang="en-US" dirty="0">
+                    <a:solidFill>
+                      <a:srgbClr val="FF0000"/>
+                    </a:solidFill>
+                  </a:rPr>
+                  <a:t>EC</a:t>
+                </a:r>
+              </a:p>
+            </p:txBody>
+          </p:sp>
+          <p:sp>
+            <p:nvSpPr>
+              <p:cNvPr id="55" name="TextBox 54">
+                <a:extLst>
+                  <a:ext uri="{FF2B5EF4-FFF2-40B4-BE49-F238E27FC236}">
+                    <a16:creationId xmlns:a16="http://schemas.microsoft.com/office/drawing/2014/main" id="{1A64633F-C130-C640-A3A6-D5CBCE809420}"/>
+                  </a:ext>
+                </a:extLst>
+              </p:cNvPr>
+              <p:cNvSpPr txBox="1"/>
+              <p:nvPr/>
+            </p:nvSpPr>
+            <p:spPr>
+              <a:xfrm>
+                <a:off x="7725958" y="4626001"/>
+                <a:ext cx="683200" cy="369332"/>
+              </a:xfrm>
+              <a:prstGeom prst="rect">
+                <a:avLst/>
+              </a:prstGeom>
+              <a:noFill/>
+            </p:spPr>
+            <p:txBody>
+              <a:bodyPr wrap="none" rtlCol="0">
+                <a:spAutoFit/>
+              </a:bodyPr>
+              <a:lstStyle/>
+              <a:p>
+                <a:r>
+                  <a:rPr lang="en-US" dirty="0"/>
+                  <a:t>NTPP</a:t>
+                </a:r>
+              </a:p>
+            </p:txBody>
+          </p:sp>
+          <p:sp>
+            <p:nvSpPr>
+              <p:cNvPr id="56" name="TextBox 55">
+                <a:extLst>
+                  <a:ext uri="{FF2B5EF4-FFF2-40B4-BE49-F238E27FC236}">
+                    <a16:creationId xmlns:a16="http://schemas.microsoft.com/office/drawing/2014/main" id="{75406E95-B618-A94E-89A2-2C72C18427C3}"/>
+                  </a:ext>
+                </a:extLst>
+              </p:cNvPr>
+              <p:cNvSpPr txBox="1"/>
+              <p:nvPr/>
+            </p:nvSpPr>
+            <p:spPr>
+              <a:xfrm>
+                <a:off x="7136166" y="4497201"/>
+                <a:ext cx="417615" cy="369332"/>
+              </a:xfrm>
+              <a:prstGeom prst="rect">
+                <a:avLst/>
+              </a:prstGeom>
+              <a:noFill/>
+            </p:spPr>
+            <p:txBody>
+              <a:bodyPr wrap="none" rtlCol="0">
+                <a:spAutoFit/>
+              </a:bodyPr>
+              <a:lstStyle/>
+              <a:p>
+                <a:r>
+                  <a:rPr lang="en-US" dirty="0"/>
+                  <a:t>EC</a:t>
+                </a:r>
+              </a:p>
+            </p:txBody>
+          </p:sp>
+          <p:sp>
+            <p:nvSpPr>
+              <p:cNvPr id="57" name="TextBox 56">
+                <a:extLst>
+                  <a:ext uri="{FF2B5EF4-FFF2-40B4-BE49-F238E27FC236}">
+                    <a16:creationId xmlns:a16="http://schemas.microsoft.com/office/drawing/2014/main" id="{98DA7FDF-DBE3-5A4C-9C83-ADCBCF88C818}"/>
+                  </a:ext>
+                </a:extLst>
+              </p:cNvPr>
+              <p:cNvSpPr txBox="1"/>
+              <p:nvPr/>
+            </p:nvSpPr>
+            <p:spPr>
+              <a:xfrm rot="1563311">
+                <a:off x="6455026" y="4588524"/>
+                <a:ext cx="450764" cy="369332"/>
+              </a:xfrm>
+              <a:prstGeom prst="rect">
+                <a:avLst/>
+              </a:prstGeom>
+              <a:noFill/>
+            </p:spPr>
+            <p:txBody>
+              <a:bodyPr wrap="none" rtlCol="0">
+                <a:spAutoFit/>
+              </a:bodyPr>
+              <a:lstStyle/>
+              <a:p>
+                <a:r>
+                  <a:rPr lang="en-US" dirty="0"/>
+                  <a:t>DC</a:t>
+                </a:r>
+                <a:endParaRPr lang="en-US" strike="sngStrike" dirty="0"/>
+              </a:p>
+            </p:txBody>
+          </p:sp>
+          <p:sp>
+            <p:nvSpPr>
+              <p:cNvPr id="58" name="TextBox 57">
+                <a:extLst>
+                  <a:ext uri="{FF2B5EF4-FFF2-40B4-BE49-F238E27FC236}">
+                    <a16:creationId xmlns:a16="http://schemas.microsoft.com/office/drawing/2014/main" id="{922076C1-90FF-9345-9773-416229AB1CDE}"/>
+                  </a:ext>
+                </a:extLst>
+              </p:cNvPr>
+              <p:cNvSpPr txBox="1"/>
+              <p:nvPr/>
+            </p:nvSpPr>
+            <p:spPr>
+              <a:xfrm>
+                <a:off x="4252012" y="2605811"/>
+                <a:ext cx="417615" cy="369332"/>
+              </a:xfrm>
+              <a:prstGeom prst="rect">
+                <a:avLst/>
+              </a:prstGeom>
+              <a:noFill/>
+            </p:spPr>
+            <p:txBody>
+              <a:bodyPr wrap="none" rtlCol="0">
+                <a:spAutoFit/>
+              </a:bodyPr>
+              <a:lstStyle/>
+              <a:p>
+                <a:r>
+                  <a:rPr lang="en-US" dirty="0">
+                    <a:solidFill>
+                      <a:srgbClr val="FF0000"/>
+                    </a:solidFill>
+                  </a:rPr>
+                  <a:t>EC</a:t>
+                </a:r>
+              </a:p>
+            </p:txBody>
+          </p:sp>
+          <p:sp>
+            <p:nvSpPr>
+              <p:cNvPr id="60" name="TextBox 59">
+                <a:extLst>
+                  <a:ext uri="{FF2B5EF4-FFF2-40B4-BE49-F238E27FC236}">
+                    <a16:creationId xmlns:a16="http://schemas.microsoft.com/office/drawing/2014/main" id="{5BF8C4A2-1436-CB41-B5EE-6BD419659278}"/>
+                  </a:ext>
+                </a:extLst>
+              </p:cNvPr>
+              <p:cNvSpPr txBox="1"/>
+              <p:nvPr/>
+            </p:nvSpPr>
+            <p:spPr>
+              <a:xfrm>
+                <a:off x="7293407" y="2584271"/>
+                <a:ext cx="455574" cy="369332"/>
+              </a:xfrm>
+              <a:prstGeom prst="rect">
+                <a:avLst/>
+              </a:prstGeom>
+              <a:noFill/>
+            </p:spPr>
+            <p:txBody>
+              <a:bodyPr wrap="none" rtlCol="0">
+                <a:spAutoFit/>
+              </a:bodyPr>
+              <a:lstStyle/>
+              <a:p>
+                <a:r>
+                  <a:rPr lang="en-US" dirty="0">
+                    <a:solidFill>
+                      <a:srgbClr val="FF0000"/>
+                    </a:solidFill>
+                  </a:rPr>
+                  <a:t>PO</a:t>
+                </a:r>
+              </a:p>
+            </p:txBody>
+          </p:sp>
+          <p:sp>
+            <p:nvSpPr>
+              <p:cNvPr id="47" name="Oval 46">
+                <a:extLst>
+                  <a:ext uri="{FF2B5EF4-FFF2-40B4-BE49-F238E27FC236}">
+                    <a16:creationId xmlns:a16="http://schemas.microsoft.com/office/drawing/2014/main" id="{235A931C-E2CC-714F-8762-83D8A187C2F8}"/>
+                  </a:ext>
+                </a:extLst>
+              </p:cNvPr>
+              <p:cNvSpPr/>
+              <p:nvPr/>
+            </p:nvSpPr>
+            <p:spPr>
+              <a:xfrm>
+                <a:off x="5905511" y="4531039"/>
+                <a:ext cx="150828" cy="150828"/>
+              </a:xfrm>
+              <a:prstGeom prst="ellipse">
+                <a:avLst/>
+              </a:prstGeom>
+              <a:solidFill>
+                <a:schemeClr val="bg1"/>
+              </a:solidFill>
+              <a:ln>
+                <a:noFill/>
+              </a:ln>
+            </p:spPr>
+            <p:style>
+              <a:lnRef idx="2">
+                <a:schemeClr val="accent1">
+                  <a:shade val="50000"/>
+                </a:schemeClr>
+              </a:lnRef>
+              <a:fillRef idx="1">
+                <a:schemeClr val="accent1"/>
+              </a:fillRef>
+              <a:effectRef idx="0">
+                <a:schemeClr val="accent1"/>
+              </a:effectRef>
+              <a:fontRef idx="minor">
+                <a:schemeClr val="lt1"/>
+              </a:fontRef>
+            </p:style>
+            <p:txBody>
+              <a:bodyPr rtlCol="0" anchor="ctr"/>
+              <a:lstStyle/>
+              <a:p>
+                <a:pPr algn="ctr"/>
+                <a:endParaRPr lang="en-US"/>
+              </a:p>
+            </p:txBody>
+          </p:sp>
+          <p:sp>
+            <p:nvSpPr>
+              <p:cNvPr id="7" name="Rounded Rectangle 6">
+                <a:extLst>
+                  <a:ext uri="{FF2B5EF4-FFF2-40B4-BE49-F238E27FC236}">
+                    <a16:creationId xmlns:a16="http://schemas.microsoft.com/office/drawing/2014/main" id="{3CC7A131-3377-5B44-8F29-319A6C7F5B5D}"/>
+                  </a:ext>
+                </a:extLst>
+              </p:cNvPr>
+              <p:cNvSpPr/>
+              <p:nvPr/>
+            </p:nvSpPr>
+            <p:spPr>
+              <a:xfrm>
+                <a:off x="3223987" y="3438536"/>
+                <a:ext cx="1272321" cy="439873"/>
+              </a:xfrm>
+              <a:prstGeom prst="roundRect">
+                <a:avLst/>
+              </a:prstGeom>
+              <a:ln w="38100"/>
+            </p:spPr>
+            <p:style>
+              <a:lnRef idx="2">
+                <a:schemeClr val="dk1"/>
+              </a:lnRef>
+              <a:fillRef idx="1">
+                <a:schemeClr val="lt1"/>
+              </a:fillRef>
+              <a:effectRef idx="0">
+                <a:schemeClr val="dk1"/>
+              </a:effectRef>
+              <a:fontRef idx="minor">
+                <a:schemeClr val="dk1"/>
+              </a:fontRef>
+            </p:style>
+            <p:txBody>
+              <a:bodyPr rtlCol="0" anchor="ctr"/>
+              <a:lstStyle/>
+              <a:p>
+                <a:pPr algn="ctr"/>
+                <a:r>
+                  <a:rPr lang="en-US" dirty="0"/>
+                  <a:t>Property1</a:t>
+                </a:r>
+              </a:p>
+            </p:txBody>
+          </p:sp>
+          <p:sp>
+            <p:nvSpPr>
+              <p:cNvPr id="9" name="Rounded Rectangle 8">
+                <a:extLst>
+                  <a:ext uri="{FF2B5EF4-FFF2-40B4-BE49-F238E27FC236}">
+                    <a16:creationId xmlns:a16="http://schemas.microsoft.com/office/drawing/2014/main" id="{2AE7E888-8CF5-F544-B2CC-3BF5A206EA8E}"/>
+                  </a:ext>
+                </a:extLst>
+              </p:cNvPr>
+              <p:cNvSpPr/>
+              <p:nvPr/>
+            </p:nvSpPr>
+            <p:spPr>
+              <a:xfrm>
+                <a:off x="7474712" y="3444714"/>
+                <a:ext cx="1272321" cy="439873"/>
+              </a:xfrm>
+              <a:prstGeom prst="roundRect">
+                <a:avLst/>
+              </a:prstGeom>
+              <a:ln w="38100"/>
+            </p:spPr>
+            <p:style>
+              <a:lnRef idx="2">
+                <a:schemeClr val="dk1"/>
+              </a:lnRef>
+              <a:fillRef idx="1">
+                <a:schemeClr val="lt1"/>
+              </a:fillRef>
+              <a:effectRef idx="0">
+                <a:schemeClr val="dk1"/>
+              </a:effectRef>
+              <a:fontRef idx="minor">
+                <a:schemeClr val="dk1"/>
+              </a:fontRef>
+            </p:style>
+            <p:txBody>
+              <a:bodyPr rtlCol="0" anchor="ctr"/>
+              <a:lstStyle/>
+              <a:p>
+                <a:pPr algn="ctr"/>
+                <a:r>
+                  <a:rPr lang="en-US" dirty="0"/>
+                  <a:t>Property2</a:t>
+                </a:r>
+              </a:p>
+            </p:txBody>
+          </p:sp>
+          <p:sp>
+            <p:nvSpPr>
+              <p:cNvPr id="44" name="Oval 43">
+                <a:extLst>
+                  <a:ext uri="{FF2B5EF4-FFF2-40B4-BE49-F238E27FC236}">
+                    <a16:creationId xmlns:a16="http://schemas.microsoft.com/office/drawing/2014/main" id="{468B9810-E043-954D-A0C3-B45BE01F852F}"/>
+                  </a:ext>
+                </a:extLst>
+              </p:cNvPr>
+              <p:cNvSpPr/>
+              <p:nvPr/>
+            </p:nvSpPr>
+            <p:spPr>
+              <a:xfrm>
+                <a:off x="6574654" y="3586246"/>
+                <a:ext cx="150828" cy="150828"/>
+              </a:xfrm>
+              <a:prstGeom prst="ellipse">
+                <a:avLst/>
+              </a:prstGeom>
+              <a:solidFill>
+                <a:schemeClr val="bg1"/>
+              </a:solidFill>
+              <a:ln>
+                <a:noFill/>
+              </a:ln>
+            </p:spPr>
+            <p:style>
+              <a:lnRef idx="2">
+                <a:schemeClr val="accent1">
+                  <a:shade val="50000"/>
+                </a:schemeClr>
+              </a:lnRef>
+              <a:fillRef idx="1">
+                <a:schemeClr val="accent1"/>
+              </a:fillRef>
+              <a:effectRef idx="0">
+                <a:schemeClr val="accent1"/>
+              </a:effectRef>
+              <a:fontRef idx="minor">
+                <a:schemeClr val="lt1"/>
+              </a:fontRef>
+            </p:style>
+            <p:txBody>
+              <a:bodyPr rtlCol="0" anchor="ctr"/>
+              <a:lstStyle/>
+              <a:p>
+                <a:pPr algn="ctr"/>
+                <a:endParaRPr lang="en-US"/>
+              </a:p>
+            </p:txBody>
+          </p:sp>
+          <p:sp>
+            <p:nvSpPr>
+              <p:cNvPr id="45" name="Oval 44">
+                <a:extLst>
+                  <a:ext uri="{FF2B5EF4-FFF2-40B4-BE49-F238E27FC236}">
+                    <a16:creationId xmlns:a16="http://schemas.microsoft.com/office/drawing/2014/main" id="{9895FE1C-0F98-BC4B-9A24-2B34C78A39EA}"/>
+                  </a:ext>
+                </a:extLst>
+              </p:cNvPr>
+              <p:cNvSpPr/>
+              <p:nvPr/>
+            </p:nvSpPr>
+            <p:spPr>
+              <a:xfrm>
+                <a:off x="5228184" y="3586246"/>
+                <a:ext cx="150828" cy="150828"/>
+              </a:xfrm>
+              <a:prstGeom prst="ellipse">
+                <a:avLst/>
+              </a:prstGeom>
+              <a:solidFill>
+                <a:schemeClr val="bg1"/>
+              </a:solidFill>
+              <a:ln>
+                <a:noFill/>
+              </a:ln>
+            </p:spPr>
+            <p:style>
+              <a:lnRef idx="2">
+                <a:schemeClr val="accent1">
+                  <a:shade val="50000"/>
+                </a:schemeClr>
+              </a:lnRef>
+              <a:fillRef idx="1">
+                <a:schemeClr val="accent1"/>
+              </a:fillRef>
+              <a:effectRef idx="0">
+                <a:schemeClr val="accent1"/>
+              </a:effectRef>
+              <a:fontRef idx="minor">
+                <a:schemeClr val="lt1"/>
+              </a:fontRef>
+            </p:style>
+            <p:txBody>
+              <a:bodyPr rtlCol="0" anchor="ctr"/>
+              <a:lstStyle/>
+              <a:p>
+                <a:pPr algn="ctr"/>
+                <a:endParaRPr lang="en-US"/>
+              </a:p>
+            </p:txBody>
+          </p:sp>
+          <p:sp>
+            <p:nvSpPr>
+              <p:cNvPr id="46" name="Oval 45">
+                <a:extLst>
+                  <a:ext uri="{FF2B5EF4-FFF2-40B4-BE49-F238E27FC236}">
+                    <a16:creationId xmlns:a16="http://schemas.microsoft.com/office/drawing/2014/main" id="{5AF8BE8F-BA22-8B41-BD6C-5A0BAA2AF665}"/>
+                  </a:ext>
+                </a:extLst>
+              </p:cNvPr>
+              <p:cNvSpPr/>
+              <p:nvPr/>
+            </p:nvSpPr>
+            <p:spPr>
+              <a:xfrm>
+                <a:off x="6809417" y="4063000"/>
+                <a:ext cx="150828" cy="150828"/>
+              </a:xfrm>
+              <a:prstGeom prst="ellipse">
+                <a:avLst/>
+              </a:prstGeom>
+              <a:solidFill>
+                <a:schemeClr val="bg1"/>
+              </a:solidFill>
+              <a:ln>
+                <a:noFill/>
+              </a:ln>
+            </p:spPr>
+            <p:style>
+              <a:lnRef idx="2">
+                <a:schemeClr val="accent1">
+                  <a:shade val="50000"/>
+                </a:schemeClr>
+              </a:lnRef>
+              <a:fillRef idx="1">
+                <a:schemeClr val="accent1"/>
+              </a:fillRef>
+              <a:effectRef idx="0">
+                <a:schemeClr val="accent1"/>
+              </a:effectRef>
+              <a:fontRef idx="minor">
+                <a:schemeClr val="lt1"/>
+              </a:fontRef>
+            </p:style>
+            <p:txBody>
+              <a:bodyPr rtlCol="0" anchor="ctr"/>
+              <a:lstStyle/>
+              <a:p>
+                <a:pPr algn="ctr"/>
+                <a:endParaRPr lang="en-US"/>
+              </a:p>
+            </p:txBody>
+          </p:sp>
+          <p:cxnSp>
+            <p:nvCxnSpPr>
+              <p:cNvPr id="15" name="Straight Arrow Connector 14">
+                <a:extLst>
+                  <a:ext uri="{FF2B5EF4-FFF2-40B4-BE49-F238E27FC236}">
+                    <a16:creationId xmlns:a16="http://schemas.microsoft.com/office/drawing/2014/main" id="{87C9CEA4-1399-8B47-8048-49E15D3B0668}"/>
+                  </a:ext>
+                </a:extLst>
+              </p:cNvPr>
+              <p:cNvCxnSpPr>
+                <a:cxnSpLocks/>
+              </p:cNvCxnSpPr>
+              <p:nvPr/>
+            </p:nvCxnSpPr>
+            <p:spPr>
+              <a:xfrm flipV="1">
+                <a:off x="4496306" y="2477276"/>
+                <a:ext cx="1380758" cy="2896318"/>
+              </a:xfrm>
+              <a:prstGeom prst="straightConnector1">
+                <a:avLst/>
+              </a:prstGeom>
+              <a:ln w="38100">
+                <a:solidFill>
+                  <a:schemeClr val="tx1"/>
+                </a:solidFill>
+                <a:headEnd type="none" w="med" len="med"/>
+                <a:tailEnd type="triangle" w="med" len="med"/>
+              </a:ln>
+            </p:spPr>
+            <p:style>
+              <a:lnRef idx="1">
+                <a:schemeClr val="accent1"/>
+              </a:lnRef>
+              <a:fillRef idx="0">
+                <a:schemeClr val="accent1"/>
+              </a:fillRef>
+              <a:effectRef idx="0">
+                <a:schemeClr val="accent1"/>
+              </a:effectRef>
+              <a:fontRef idx="minor">
+                <a:schemeClr val="tx1"/>
+              </a:fontRef>
+            </p:style>
+          </p:cxnSp>
+          <p:sp>
+            <p:nvSpPr>
+              <p:cNvPr id="48" name="Oval 47">
+                <a:extLst>
+                  <a:ext uri="{FF2B5EF4-FFF2-40B4-BE49-F238E27FC236}">
+                    <a16:creationId xmlns:a16="http://schemas.microsoft.com/office/drawing/2014/main" id="{550BECEF-CD7C-254F-9A2A-BEFF0CEC79B7}"/>
+                  </a:ext>
+                </a:extLst>
+              </p:cNvPr>
+              <p:cNvSpPr/>
+              <p:nvPr/>
+            </p:nvSpPr>
+            <p:spPr>
+              <a:xfrm>
+                <a:off x="5000492" y="4068765"/>
+                <a:ext cx="150828" cy="150828"/>
+              </a:xfrm>
+              <a:prstGeom prst="ellipse">
+                <a:avLst/>
+              </a:prstGeom>
+              <a:solidFill>
+                <a:schemeClr val="bg1"/>
+              </a:solidFill>
+              <a:ln>
+                <a:noFill/>
+              </a:ln>
+            </p:spPr>
+            <p:style>
+              <a:lnRef idx="2">
+                <a:schemeClr val="accent1">
+                  <a:shade val="50000"/>
+                </a:schemeClr>
+              </a:lnRef>
+              <a:fillRef idx="1">
+                <a:schemeClr val="accent1"/>
+              </a:fillRef>
+              <a:effectRef idx="0">
+                <a:schemeClr val="accent1"/>
+              </a:effectRef>
+              <a:fontRef idx="minor">
+                <a:schemeClr val="lt1"/>
+              </a:fontRef>
+            </p:style>
+            <p:txBody>
+              <a:bodyPr rtlCol="0" anchor="ctr"/>
+              <a:lstStyle/>
+              <a:p>
+                <a:pPr algn="ctr"/>
+                <a:endParaRPr lang="en-US"/>
+              </a:p>
+            </p:txBody>
+          </p:sp>
+          <p:cxnSp>
+            <p:nvCxnSpPr>
+              <p:cNvPr id="35" name="Straight Arrow Connector 34">
+                <a:extLst>
+                  <a:ext uri="{FF2B5EF4-FFF2-40B4-BE49-F238E27FC236}">
+                    <a16:creationId xmlns:a16="http://schemas.microsoft.com/office/drawing/2014/main" id="{F9A592B3-794D-6843-9750-659102B126F0}"/>
+                  </a:ext>
+                </a:extLst>
+              </p:cNvPr>
+              <p:cNvCxnSpPr>
+                <a:cxnSpLocks/>
+              </p:cNvCxnSpPr>
+              <p:nvPr/>
+            </p:nvCxnSpPr>
+            <p:spPr>
+              <a:xfrm flipH="1" flipV="1">
+                <a:off x="6093952" y="2471717"/>
+                <a:ext cx="1380758" cy="2883505"/>
+              </a:xfrm>
+              <a:prstGeom prst="straightConnector1">
+                <a:avLst/>
+              </a:prstGeom>
+              <a:ln w="38100">
+                <a:solidFill>
+                  <a:schemeClr val="tx1"/>
+                </a:solidFill>
+                <a:headEnd type="none" w="med" len="med"/>
+                <a:tailEnd type="triangle" w="med" len="med"/>
+              </a:ln>
+            </p:spPr>
+            <p:style>
+              <a:lnRef idx="1">
+                <a:schemeClr val="accent1"/>
+              </a:lnRef>
+              <a:fillRef idx="0">
+                <a:schemeClr val="accent1"/>
+              </a:fillRef>
+              <a:effectRef idx="0">
+                <a:schemeClr val="accent1"/>
+              </a:effectRef>
+              <a:fontRef idx="minor">
+                <a:schemeClr val="tx1"/>
+              </a:fontRef>
+            </p:style>
+          </p:cxnSp>
+          <p:cxnSp>
+            <p:nvCxnSpPr>
+              <p:cNvPr id="16" name="Straight Arrow Connector 15">
+                <a:extLst>
+                  <a:ext uri="{FF2B5EF4-FFF2-40B4-BE49-F238E27FC236}">
+                    <a16:creationId xmlns:a16="http://schemas.microsoft.com/office/drawing/2014/main" id="{3188ECC1-634F-7046-B38F-C17C28CBEB81}"/>
+                  </a:ext>
+                </a:extLst>
+              </p:cNvPr>
+              <p:cNvCxnSpPr>
+                <a:cxnSpLocks/>
+              </p:cNvCxnSpPr>
+              <p:nvPr/>
+            </p:nvCxnSpPr>
+            <p:spPr>
+              <a:xfrm flipH="1" flipV="1">
+                <a:off x="4496305" y="3857538"/>
+                <a:ext cx="2978405" cy="1497683"/>
+              </a:xfrm>
+              <a:prstGeom prst="straightConnector1">
+                <a:avLst/>
+              </a:prstGeom>
+              <a:ln w="38100">
+                <a:solidFill>
+                  <a:schemeClr val="tx1"/>
+                </a:solidFill>
+                <a:headEnd type="none" w="med" len="med"/>
+                <a:tailEnd type="triangle" w="med" len="med"/>
+              </a:ln>
+            </p:spPr>
+            <p:style>
+              <a:lnRef idx="1">
+                <a:schemeClr val="accent1"/>
+              </a:lnRef>
+              <a:fillRef idx="0">
+                <a:schemeClr val="accent1"/>
+              </a:fillRef>
+              <a:effectRef idx="0">
+                <a:schemeClr val="accent1"/>
+              </a:effectRef>
+              <a:fontRef idx="minor">
+                <a:schemeClr val="tx1"/>
+              </a:fontRef>
+            </p:style>
+          </p:cxnSp>
+          <p:sp>
+            <p:nvSpPr>
+              <p:cNvPr id="5" name="Rounded Rectangle 4">
+                <a:extLst>
+                  <a:ext uri="{FF2B5EF4-FFF2-40B4-BE49-F238E27FC236}">
+                    <a16:creationId xmlns:a16="http://schemas.microsoft.com/office/drawing/2014/main" id="{F30D2CC4-9187-5F42-B2B7-F16C0BE509F8}"/>
+                  </a:ext>
+                </a:extLst>
+              </p:cNvPr>
+              <p:cNvSpPr/>
+              <p:nvPr/>
+            </p:nvSpPr>
+            <p:spPr>
+              <a:xfrm>
+                <a:off x="3860147" y="5153657"/>
+                <a:ext cx="1272321" cy="439873"/>
+              </a:xfrm>
+              <a:prstGeom prst="roundRect">
+                <a:avLst/>
+              </a:prstGeom>
+              <a:ln w="38100"/>
+            </p:spPr>
+            <p:style>
+              <a:lnRef idx="2">
+                <a:schemeClr val="dk1"/>
+              </a:lnRef>
+              <a:fillRef idx="1">
+                <a:schemeClr val="lt1"/>
+              </a:fillRef>
+              <a:effectRef idx="0">
+                <a:schemeClr val="dk1"/>
+              </a:effectRef>
+              <a:fontRef idx="minor">
+                <a:schemeClr val="dk1"/>
+              </a:fontRef>
+            </p:style>
+            <p:txBody>
+              <a:bodyPr rtlCol="0" anchor="ctr"/>
+              <a:lstStyle/>
+              <a:p>
+                <a:pPr algn="ctr"/>
+                <a:r>
+                  <a:rPr lang="en-US" dirty="0"/>
+                  <a:t>House1</a:t>
+                </a:r>
+              </a:p>
+            </p:txBody>
+          </p:sp>
+          <p:sp>
+            <p:nvSpPr>
+              <p:cNvPr id="8" name="Rounded Rectangle 7">
+                <a:extLst>
+                  <a:ext uri="{FF2B5EF4-FFF2-40B4-BE49-F238E27FC236}">
+                    <a16:creationId xmlns:a16="http://schemas.microsoft.com/office/drawing/2014/main" id="{C21205AE-DB06-2449-8129-C475EF706134}"/>
+                  </a:ext>
+                </a:extLst>
+              </p:cNvPr>
+              <p:cNvSpPr/>
+              <p:nvPr/>
+            </p:nvSpPr>
+            <p:spPr>
+              <a:xfrm>
+                <a:off x="6838551" y="5138882"/>
+                <a:ext cx="1272321" cy="439873"/>
+              </a:xfrm>
+              <a:prstGeom prst="roundRect">
+                <a:avLst/>
+              </a:prstGeom>
+              <a:ln w="38100"/>
+            </p:spPr>
+            <p:style>
+              <a:lnRef idx="2">
+                <a:schemeClr val="dk1"/>
+              </a:lnRef>
+              <a:fillRef idx="1">
+                <a:schemeClr val="lt1"/>
+              </a:fillRef>
+              <a:effectRef idx="0">
+                <a:schemeClr val="dk1"/>
+              </a:effectRef>
+              <a:fontRef idx="minor">
+                <a:schemeClr val="dk1"/>
+              </a:fontRef>
+            </p:style>
+            <p:txBody>
+              <a:bodyPr rtlCol="0" anchor="ctr"/>
+              <a:lstStyle/>
+              <a:p>
+                <a:pPr algn="ctr"/>
+                <a:r>
+                  <a:rPr lang="en-US" dirty="0"/>
+                  <a:t>House2</a:t>
+                </a:r>
+              </a:p>
+            </p:txBody>
+          </p:sp>
+        </p:grpSp>
+        <p:sp>
+          <p:nvSpPr>
+            <p:cNvPr id="34" name="TextBox 33">
+              <a:extLst>
+                <a:ext uri="{FF2B5EF4-FFF2-40B4-BE49-F238E27FC236}">
+                  <a16:creationId xmlns:a16="http://schemas.microsoft.com/office/drawing/2014/main" id="{8BE01C8B-19A4-5A42-995D-A67FAEC636F9}"/>
+                </a:ext>
+              </a:extLst>
+            </p:cNvPr>
+            <p:cNvSpPr txBox="1"/>
+            <p:nvPr/>
+          </p:nvSpPr>
+          <p:spPr>
+            <a:xfrm>
+              <a:off x="5692314" y="3826237"/>
+              <a:ext cx="598241" cy="584775"/>
+            </a:xfrm>
+            <a:prstGeom prst="rect">
+              <a:avLst/>
+            </a:prstGeom>
+            <a:noFill/>
+          </p:spPr>
+          <p:txBody>
+            <a:bodyPr wrap="none" rtlCol="0">
+              <a:spAutoFit/>
+            </a:bodyPr>
+            <a:lstStyle/>
+            <a:p>
+              <a:r>
+                <a:rPr lang="en-US" sz="3200" dirty="0"/>
+                <a:t>#3</a:t>
+              </a:r>
+            </a:p>
+          </p:txBody>
+        </p:sp>
+      </p:grpSp>
+      <p:sp>
+        <p:nvSpPr>
+          <p:cNvPr id="64" name="Rectangle 63">
+            <a:extLst>
+              <a:ext uri="{FF2B5EF4-FFF2-40B4-BE49-F238E27FC236}">
+                <a16:creationId xmlns:a16="http://schemas.microsoft.com/office/drawing/2014/main" id="{7E5D5FE3-189C-9A40-BCCE-D6D47D93A4CE}"/>
+              </a:ext>
+            </a:extLst>
+          </p:cNvPr>
+          <p:cNvSpPr/>
+          <p:nvPr/>
+        </p:nvSpPr>
+        <p:spPr>
+          <a:xfrm>
+            <a:off x="7388010" y="2690213"/>
+            <a:ext cx="1719692" cy="1533099"/>
+          </a:xfrm>
+          <a:prstGeom prst="rect">
+            <a:avLst/>
+          </a:prstGeom>
+          <a:solidFill>
+            <a:srgbClr val="C5E0B4">
+              <a:alpha val="50196"/>
+            </a:srgbClr>
+          </a:solidFill>
+        </p:spPr>
+        <p:style>
+          <a:lnRef idx="2">
+            <a:schemeClr val="dk1"/>
+          </a:lnRef>
+          <a:fillRef idx="1">
+            <a:schemeClr val="lt1"/>
+          </a:fillRef>
+          <a:effectRef idx="0">
+            <a:schemeClr val="dk1"/>
+          </a:effectRef>
+          <a:fontRef idx="minor">
+            <a:schemeClr val="dk1"/>
+          </a:fontRef>
+        </p:style>
+        <p:txBody>
+          <a:bodyPr rtlCol="0" anchor="t" anchorCtr="0"/>
+          <a:lstStyle/>
+          <a:p>
+            <a:pPr algn="ctr"/>
+            <a:r>
+              <a:rPr lang="en-US" dirty="0"/>
+              <a:t>Property1</a:t>
+            </a:r>
+          </a:p>
+        </p:txBody>
+      </p:sp>
+      <p:sp>
+        <p:nvSpPr>
+          <p:cNvPr id="65" name="Rectangle 64">
+            <a:extLst>
+              <a:ext uri="{FF2B5EF4-FFF2-40B4-BE49-F238E27FC236}">
+                <a16:creationId xmlns:a16="http://schemas.microsoft.com/office/drawing/2014/main" id="{E34BF133-DCEE-2442-B05E-B8F99EE9AF9D}"/>
+              </a:ext>
+            </a:extLst>
+          </p:cNvPr>
+          <p:cNvSpPr/>
+          <p:nvPr/>
+        </p:nvSpPr>
+        <p:spPr>
+          <a:xfrm>
+            <a:off x="9103423" y="2813303"/>
+            <a:ext cx="1719692" cy="1533099"/>
+          </a:xfrm>
+          <a:prstGeom prst="rect">
+            <a:avLst/>
+          </a:prstGeom>
+          <a:solidFill>
+            <a:srgbClr val="F4B183">
+              <a:alpha val="50196"/>
+            </a:srgbClr>
+          </a:solidFill>
+        </p:spPr>
+        <p:style>
+          <a:lnRef idx="2">
+            <a:schemeClr val="dk1"/>
+          </a:lnRef>
+          <a:fillRef idx="1">
+            <a:schemeClr val="lt1"/>
+          </a:fillRef>
+          <a:effectRef idx="0">
+            <a:schemeClr val="dk1"/>
+          </a:effectRef>
+          <a:fontRef idx="minor">
+            <a:schemeClr val="dk1"/>
+          </a:fontRef>
+        </p:style>
+        <p:txBody>
+          <a:bodyPr rtlCol="0" anchor="t" anchorCtr="0"/>
+          <a:lstStyle/>
+          <a:p>
+            <a:pPr algn="ctr"/>
+            <a:r>
+              <a:rPr lang="en-US" dirty="0"/>
+              <a:t>Property2</a:t>
+            </a:r>
+          </a:p>
+        </p:txBody>
+      </p:sp>
+      <p:sp>
+        <p:nvSpPr>
+          <p:cNvPr id="66" name="Rectangle 65">
+            <a:extLst>
+              <a:ext uri="{FF2B5EF4-FFF2-40B4-BE49-F238E27FC236}">
+                <a16:creationId xmlns:a16="http://schemas.microsoft.com/office/drawing/2014/main" id="{FBA9EE22-BAEB-B84E-9F19-7F524D317FEE}"/>
+              </a:ext>
+            </a:extLst>
+          </p:cNvPr>
+          <p:cNvSpPr/>
+          <p:nvPr/>
+        </p:nvSpPr>
+        <p:spPr>
+          <a:xfrm>
+            <a:off x="8184593" y="3180237"/>
+            <a:ext cx="918829" cy="621598"/>
+          </a:xfrm>
+          <a:prstGeom prst="rect">
+            <a:avLst/>
+          </a:prstGeom>
+          <a:solidFill>
+            <a:srgbClr val="548235">
+              <a:alpha val="50196"/>
+            </a:srgbClr>
+          </a:solidFill>
+        </p:spPr>
+        <p:style>
+          <a:lnRef idx="2">
+            <a:schemeClr val="dk1"/>
+          </a:lnRef>
+          <a:fillRef idx="1">
+            <a:schemeClr val="lt1"/>
+          </a:fillRef>
+          <a:effectRef idx="0">
+            <a:schemeClr val="dk1"/>
+          </a:effectRef>
+          <a:fontRef idx="minor">
+            <a:schemeClr val="dk1"/>
+          </a:fontRef>
+        </p:style>
+        <p:txBody>
+          <a:bodyPr rtlCol="0" anchor="ctr" anchorCtr="0"/>
+          <a:lstStyle/>
+          <a:p>
+            <a:pPr algn="ctr"/>
+            <a:r>
+              <a:rPr lang="en-US" dirty="0"/>
+              <a:t>House1</a:t>
+            </a:r>
+          </a:p>
+        </p:txBody>
+      </p:sp>
+      <p:sp>
+        <p:nvSpPr>
+          <p:cNvPr id="67" name="Rectangle 66">
+            <a:extLst>
+              <a:ext uri="{FF2B5EF4-FFF2-40B4-BE49-F238E27FC236}">
+                <a16:creationId xmlns:a16="http://schemas.microsoft.com/office/drawing/2014/main" id="{49760F91-852F-8647-A5E4-F0BD39DA8058}"/>
+              </a:ext>
+            </a:extLst>
+          </p:cNvPr>
+          <p:cNvSpPr/>
+          <p:nvPr/>
+        </p:nvSpPr>
+        <p:spPr>
+          <a:xfrm>
+            <a:off x="9532354" y="3303327"/>
+            <a:ext cx="918829" cy="621598"/>
+          </a:xfrm>
+          <a:prstGeom prst="rect">
+            <a:avLst/>
+          </a:prstGeom>
+          <a:solidFill>
+            <a:srgbClr val="C55A11">
+              <a:alpha val="50196"/>
+            </a:srgbClr>
+          </a:solidFill>
+        </p:spPr>
+        <p:style>
+          <a:lnRef idx="2">
+            <a:schemeClr val="dk1"/>
+          </a:lnRef>
+          <a:fillRef idx="1">
+            <a:schemeClr val="lt1"/>
+          </a:fillRef>
+          <a:effectRef idx="0">
+            <a:schemeClr val="dk1"/>
+          </a:effectRef>
+          <a:fontRef idx="minor">
+            <a:schemeClr val="dk1"/>
+          </a:fontRef>
+        </p:style>
+        <p:txBody>
+          <a:bodyPr rtlCol="0" anchor="ctr" anchorCtr="0"/>
+          <a:lstStyle/>
+          <a:p>
+            <a:pPr algn="ctr"/>
+            <a:r>
+              <a:rPr lang="en-US" dirty="0"/>
+              <a:t>House2</a:t>
+            </a:r>
+          </a:p>
+        </p:txBody>
+      </p:sp>
+      <p:sp>
+        <p:nvSpPr>
+          <p:cNvPr id="68" name="Rectangle 67">
+            <a:extLst>
+              <a:ext uri="{FF2B5EF4-FFF2-40B4-BE49-F238E27FC236}">
+                <a16:creationId xmlns:a16="http://schemas.microsoft.com/office/drawing/2014/main" id="{0B85FE94-9BF3-654C-998C-457D05AEC397}"/>
+              </a:ext>
+            </a:extLst>
+          </p:cNvPr>
+          <p:cNvSpPr/>
+          <p:nvPr/>
+        </p:nvSpPr>
+        <p:spPr>
+          <a:xfrm>
+            <a:off x="6975231" y="4220240"/>
+            <a:ext cx="4378569" cy="621598"/>
+          </a:xfrm>
+          <a:prstGeom prst="rect">
+            <a:avLst/>
+          </a:prstGeom>
+          <a:solidFill>
+            <a:srgbClr val="BFBFBF">
+              <a:alpha val="50196"/>
+            </a:srgbClr>
+          </a:solidFill>
+        </p:spPr>
+        <p:style>
+          <a:lnRef idx="2">
+            <a:schemeClr val="dk1"/>
+          </a:lnRef>
+          <a:fillRef idx="1">
+            <a:schemeClr val="lt1"/>
+          </a:fillRef>
+          <a:effectRef idx="0">
+            <a:schemeClr val="dk1"/>
+          </a:effectRef>
+          <a:fontRef idx="minor">
+            <a:schemeClr val="dk1"/>
+          </a:fontRef>
+        </p:style>
+        <p:txBody>
+          <a:bodyPr rtlCol="0" anchor="b" anchorCtr="0"/>
+          <a:lstStyle/>
+          <a:p>
+            <a:pPr algn="ctr"/>
+            <a:r>
+              <a:rPr lang="en-US" dirty="0"/>
+              <a:t>Road</a:t>
+            </a:r>
+          </a:p>
+        </p:txBody>
+      </p:sp>
+    </p:spTree>
+    <p:extLst>
+      <p:ext uri="{BB962C8B-B14F-4D97-AF65-F5344CB8AC3E}">
+        <p14:creationId xmlns:p14="http://schemas.microsoft.com/office/powerpoint/2010/main" val="3729733305"/>
+      </p:ext>
+    </p:extLst>
+  </p:cSld>
+  <p:clrMapOvr>
+    <a:masterClrMapping/>
+  </p:clrMapOvr>
+</p:sld>
+</file>
+
+<file path=ppt/slides/slide8.xml><?xml version="1.0" encoding="utf-8"?>
 <p:sld xmlns:a="http://schemas.openxmlformats.org/drawingml/2006/main" xmlns:r="http://schemas.openxmlformats.org/officeDocument/2006/relationships" xmlns:p="http://schemas.openxmlformats.org/presentationml/2006/main">
   <p:cSld>
     <p:spTree>
@@ -17576,7 +19565,7 @@
         </p:nvGrpSpPr>
         <p:grpSpPr>
           <a:xfrm>
-            <a:off x="3223987" y="2037403"/>
+            <a:off x="1092610" y="2037403"/>
             <a:ext cx="5523046" cy="3556127"/>
             <a:chOff x="3223987" y="2037403"/>
             <a:chExt cx="5523046" cy="3556127"/>
@@ -18965,1479 +20954,270 @@
           </p:txBody>
         </p:sp>
       </p:grpSp>
-    </p:spTree>
-    <p:extLst>
-      <p:ext uri="{BB962C8B-B14F-4D97-AF65-F5344CB8AC3E}">
-        <p14:creationId xmlns:p14="http://schemas.microsoft.com/office/powerpoint/2010/main" val="988019430"/>
-      </p:ext>
-    </p:extLst>
-  </p:cSld>
-  <p:clrMapOvr>
-    <a:masterClrMapping/>
-  </p:clrMapOvr>
-</p:sld>
-</file>
-
-<file path=ppt/slides/slide8.xml><?xml version="1.0" encoding="utf-8"?>
-<p:sld xmlns:a="http://schemas.openxmlformats.org/drawingml/2006/main" xmlns:r="http://schemas.openxmlformats.org/officeDocument/2006/relationships" xmlns:p="http://schemas.openxmlformats.org/presentationml/2006/main">
-  <p:cSld>
-    <p:spTree>
-      <p:nvGrpSpPr>
-        <p:cNvPr id="1" name=""/>
-        <p:cNvGrpSpPr/>
-        <p:nvPr/>
-      </p:nvGrpSpPr>
-      <p:grpSpPr>
-        <a:xfrm>
-          <a:off x="0" y="0"/>
-          <a:ext cx="0" cy="0"/>
-          <a:chOff x="0" y="0"/>
-          <a:chExt cx="0" cy="0"/>
-        </a:xfrm>
-      </p:grpSpPr>
       <p:sp>
         <p:nvSpPr>
-          <p:cNvPr id="4" name="Title 3">
+          <p:cNvPr id="61" name="Rectangle 60">
             <a:extLst>
               <a:ext uri="{FF2B5EF4-FFF2-40B4-BE49-F238E27FC236}">
-                <a16:creationId xmlns:a16="http://schemas.microsoft.com/office/drawing/2014/main" id="{D13A5089-35DD-B546-B3E4-9466511D7438}"/>
+                <a16:creationId xmlns:a16="http://schemas.microsoft.com/office/drawing/2014/main" id="{BF637ADC-B89E-D848-A40F-8FEB2D7DB2C5}"/>
               </a:ext>
             </a:extLst>
           </p:cNvPr>
-          <p:cNvSpPr>
-            <a:spLocks noGrp="1"/>
-          </p:cNvSpPr>
-          <p:nvPr>
-            <p:ph type="title"/>
-          </p:nvPr>
+          <p:cNvSpPr/>
+          <p:nvPr/>
         </p:nvSpPr>
-        <p:spPr/>
+        <p:spPr>
+          <a:xfrm>
+            <a:off x="7388010" y="2997940"/>
+            <a:ext cx="1719692" cy="1533099"/>
+          </a:xfrm>
+          <a:prstGeom prst="rect">
+            <a:avLst/>
+          </a:prstGeom>
+          <a:solidFill>
+            <a:srgbClr val="C5E0B4">
+              <a:alpha val="50196"/>
+            </a:srgbClr>
+          </a:solidFill>
+        </p:spPr>
+        <p:style>
+          <a:lnRef idx="2">
+            <a:schemeClr val="dk1"/>
+          </a:lnRef>
+          <a:fillRef idx="1">
+            <a:schemeClr val="lt1"/>
+          </a:fillRef>
+          <a:effectRef idx="0">
+            <a:schemeClr val="dk1"/>
+          </a:effectRef>
+          <a:fontRef idx="minor">
+            <a:schemeClr val="dk1"/>
+          </a:fontRef>
+        </p:style>
         <p:txBody>
-          <a:bodyPr/>
+          <a:bodyPr rtlCol="0" anchor="t" anchorCtr="0"/>
           <a:lstStyle/>
           <a:p>
             <a:pPr algn="ctr"/>
             <a:r>
               <a:rPr lang="en-US" dirty="0"/>
-              <a:t>Wikipedia’s RCC-8 Example:</a:t>
-            </a:r>
-            <a:br>
-              <a:rPr lang="en-US" dirty="0"/>
-            </a:br>
-            <a:r>
-              <a:rPr lang="en-US" dirty="0"/>
-              <a:t>Singleton Labeling #3</a:t>
+              <a:t>Property1</a:t>
             </a:r>
           </a:p>
         </p:txBody>
       </p:sp>
-      <p:grpSp>
-        <p:nvGrpSpPr>
-          <p:cNvPr id="3" name="Group 2">
+      <p:sp>
+        <p:nvSpPr>
+          <p:cNvPr id="62" name="Rectangle 61">
             <a:extLst>
               <a:ext uri="{FF2B5EF4-FFF2-40B4-BE49-F238E27FC236}">
-                <a16:creationId xmlns:a16="http://schemas.microsoft.com/office/drawing/2014/main" id="{21AA4B19-95B4-AD46-A9F2-2AE2832F2420}"/>
+                <a16:creationId xmlns:a16="http://schemas.microsoft.com/office/drawing/2014/main" id="{5E49A8E4-C9F5-AD4E-B0BE-07C7AEF070AD}"/>
               </a:ext>
             </a:extLst>
           </p:cNvPr>
-          <p:cNvGrpSpPr/>
+          <p:cNvSpPr/>
           <p:nvPr/>
-        </p:nvGrpSpPr>
-        <p:grpSpPr>
+        </p:nvSpPr>
+        <p:spPr>
           <a:xfrm>
-            <a:off x="3223987" y="2037403"/>
-            <a:ext cx="5523046" cy="3556127"/>
-            <a:chOff x="3223987" y="2037403"/>
-            <a:chExt cx="5523046" cy="3556127"/>
+            <a:off x="9103423" y="2813303"/>
+            <a:ext cx="1995968" cy="2224782"/>
           </a:xfrm>
-        </p:grpSpPr>
-        <p:grpSp>
-          <p:nvGrpSpPr>
-            <p:cNvPr id="2" name="Group 1">
-              <a:extLst>
-                <a:ext uri="{FF2B5EF4-FFF2-40B4-BE49-F238E27FC236}">
-                  <a16:creationId xmlns:a16="http://schemas.microsoft.com/office/drawing/2014/main" id="{85F47D7A-B529-7B40-8AE4-31C373330188}"/>
-                </a:ext>
-              </a:extLst>
-            </p:cNvPr>
-            <p:cNvGrpSpPr/>
-            <p:nvPr/>
-          </p:nvGrpSpPr>
-          <p:grpSpPr>
-            <a:xfrm>
-              <a:off x="3223987" y="2037403"/>
-              <a:ext cx="5523046" cy="3556127"/>
-              <a:chOff x="3223987" y="2037403"/>
-              <a:chExt cx="5523046" cy="3556127"/>
-            </a:xfrm>
-          </p:grpSpPr>
-          <p:cxnSp>
-            <p:nvCxnSpPr>
-              <p:cNvPr id="14" name="Straight Arrow Connector 13">
-                <a:extLst>
-                  <a:ext uri="{FF2B5EF4-FFF2-40B4-BE49-F238E27FC236}">
-                    <a16:creationId xmlns:a16="http://schemas.microsoft.com/office/drawing/2014/main" id="{E124D229-6D19-AD48-BE0C-2FF3078B703C}"/>
-                  </a:ext>
-                </a:extLst>
-              </p:cNvPr>
-              <p:cNvCxnSpPr>
-                <a:cxnSpLocks/>
-              </p:cNvCxnSpPr>
-              <p:nvPr/>
-            </p:nvCxnSpPr>
-            <p:spPr>
-              <a:xfrm flipV="1">
-                <a:off x="4496307" y="3847841"/>
-                <a:ext cx="2978404" cy="1525752"/>
-              </a:xfrm>
-              <a:prstGeom prst="straightConnector1">
-                <a:avLst/>
-              </a:prstGeom>
-              <a:ln w="38100">
-                <a:solidFill>
-                  <a:schemeClr val="tx1"/>
-                </a:solidFill>
-                <a:headEnd type="none" w="med" len="med"/>
-                <a:tailEnd type="triangle" w="med" len="med"/>
-              </a:ln>
-            </p:spPr>
-            <p:style>
-              <a:lnRef idx="1">
-                <a:schemeClr val="accent1"/>
-              </a:lnRef>
-              <a:fillRef idx="0">
-                <a:schemeClr val="accent1"/>
-              </a:fillRef>
-              <a:effectRef idx="0">
-                <a:schemeClr val="accent1"/>
-              </a:effectRef>
-              <a:fontRef idx="minor">
-                <a:schemeClr val="tx1"/>
-              </a:fontRef>
-            </p:style>
-          </p:cxnSp>
-          <p:cxnSp>
-            <p:nvCxnSpPr>
-              <p:cNvPr id="12" name="Straight Arrow Connector 11">
-                <a:extLst>
-                  <a:ext uri="{FF2B5EF4-FFF2-40B4-BE49-F238E27FC236}">
-                    <a16:creationId xmlns:a16="http://schemas.microsoft.com/office/drawing/2014/main" id="{202A615F-5239-F442-8AA1-09AA3EABAA34}"/>
-                  </a:ext>
-                </a:extLst>
-              </p:cNvPr>
-              <p:cNvCxnSpPr>
-                <a:stCxn id="5" idx="3"/>
-                <a:endCxn id="8" idx="1"/>
-              </p:cNvCxnSpPr>
-              <p:nvPr/>
-            </p:nvCxnSpPr>
-            <p:spPr>
-              <a:xfrm flipV="1">
-                <a:off x="5132468" y="5358819"/>
-                <a:ext cx="1706083" cy="14775"/>
-              </a:xfrm>
-              <a:prstGeom prst="straightConnector1">
-                <a:avLst/>
-              </a:prstGeom>
-              <a:ln w="38100">
-                <a:solidFill>
-                  <a:schemeClr val="tx1"/>
-                </a:solidFill>
-                <a:headEnd type="none" w="med" len="med"/>
-                <a:tailEnd type="triangle" w="med" len="med"/>
-              </a:ln>
-            </p:spPr>
-            <p:style>
-              <a:lnRef idx="1">
-                <a:schemeClr val="accent1"/>
-              </a:lnRef>
-              <a:fillRef idx="0">
-                <a:schemeClr val="accent1"/>
-              </a:fillRef>
-              <a:effectRef idx="0">
-                <a:schemeClr val="accent1"/>
-              </a:effectRef>
-              <a:fontRef idx="minor">
-                <a:schemeClr val="tx1"/>
-              </a:fontRef>
-            </p:style>
-          </p:cxnSp>
-          <p:cxnSp>
-            <p:nvCxnSpPr>
-              <p:cNvPr id="13" name="Straight Arrow Connector 12">
-                <a:extLst>
-                  <a:ext uri="{FF2B5EF4-FFF2-40B4-BE49-F238E27FC236}">
-                    <a16:creationId xmlns:a16="http://schemas.microsoft.com/office/drawing/2014/main" id="{03E3D434-9237-4C47-8552-FEA99A54B4AC}"/>
-                  </a:ext>
-                </a:extLst>
-              </p:cNvPr>
-              <p:cNvCxnSpPr>
-                <a:cxnSpLocks/>
-                <a:endCxn id="7" idx="2"/>
-              </p:cNvCxnSpPr>
-              <p:nvPr/>
-            </p:nvCxnSpPr>
-            <p:spPr>
-              <a:xfrm flipH="1" flipV="1">
-                <a:off x="3860148" y="3878409"/>
-                <a:ext cx="636159" cy="1495184"/>
-              </a:xfrm>
-              <a:prstGeom prst="straightConnector1">
-                <a:avLst/>
-              </a:prstGeom>
-              <a:ln w="38100">
-                <a:solidFill>
-                  <a:schemeClr val="tx1"/>
-                </a:solidFill>
-                <a:headEnd type="none" w="med" len="med"/>
-                <a:tailEnd type="triangle" w="med" len="med"/>
-              </a:ln>
-            </p:spPr>
-            <p:style>
-              <a:lnRef idx="1">
-                <a:schemeClr val="accent1"/>
-              </a:lnRef>
-              <a:fillRef idx="0">
-                <a:schemeClr val="accent1"/>
-              </a:fillRef>
-              <a:effectRef idx="0">
-                <a:schemeClr val="accent1"/>
-              </a:effectRef>
-              <a:fontRef idx="minor">
-                <a:schemeClr val="tx1"/>
-              </a:fontRef>
-            </p:style>
-          </p:cxnSp>
-          <p:cxnSp>
-            <p:nvCxnSpPr>
-              <p:cNvPr id="29" name="Straight Arrow Connector 28">
-                <a:extLst>
-                  <a:ext uri="{FF2B5EF4-FFF2-40B4-BE49-F238E27FC236}">
-                    <a16:creationId xmlns:a16="http://schemas.microsoft.com/office/drawing/2014/main" id="{1A8962DC-CEB3-0D4C-A07B-40AC50BDC47E}"/>
-                  </a:ext>
-                </a:extLst>
-              </p:cNvPr>
-              <p:cNvCxnSpPr>
-                <a:cxnSpLocks/>
-                <a:endCxn id="9" idx="2"/>
-              </p:cNvCxnSpPr>
-              <p:nvPr/>
-            </p:nvCxnSpPr>
-            <p:spPr>
-              <a:xfrm flipV="1">
-                <a:off x="7474711" y="3884587"/>
-                <a:ext cx="636162" cy="1443663"/>
-              </a:xfrm>
-              <a:prstGeom prst="straightConnector1">
-                <a:avLst/>
-              </a:prstGeom>
-              <a:ln w="38100">
-                <a:solidFill>
-                  <a:schemeClr val="tx1"/>
-                </a:solidFill>
-                <a:headEnd type="none" w="med" len="med"/>
-                <a:tailEnd type="triangle" w="med" len="med"/>
-              </a:ln>
-            </p:spPr>
-            <p:style>
-              <a:lnRef idx="1">
-                <a:schemeClr val="accent1"/>
-              </a:lnRef>
-              <a:fillRef idx="0">
-                <a:schemeClr val="accent1"/>
-              </a:fillRef>
-              <a:effectRef idx="0">
-                <a:schemeClr val="accent1"/>
-              </a:effectRef>
-              <a:fontRef idx="minor">
-                <a:schemeClr val="tx1"/>
-              </a:fontRef>
-            </p:style>
-          </p:cxnSp>
-          <p:cxnSp>
-            <p:nvCxnSpPr>
-              <p:cNvPr id="38" name="Straight Arrow Connector 37">
-                <a:extLst>
-                  <a:ext uri="{FF2B5EF4-FFF2-40B4-BE49-F238E27FC236}">
-                    <a16:creationId xmlns:a16="http://schemas.microsoft.com/office/drawing/2014/main" id="{FC395F21-FE9B-294B-8D1C-F675C64D1646}"/>
-                  </a:ext>
-                </a:extLst>
-              </p:cNvPr>
-              <p:cNvCxnSpPr>
-                <a:cxnSpLocks/>
-                <a:stCxn id="7" idx="3"/>
-                <a:endCxn id="9" idx="1"/>
-              </p:cNvCxnSpPr>
-              <p:nvPr/>
-            </p:nvCxnSpPr>
-            <p:spPr>
-              <a:xfrm>
-                <a:off x="4496308" y="3658473"/>
-                <a:ext cx="2978404" cy="6178"/>
-              </a:xfrm>
-              <a:prstGeom prst="straightConnector1">
-                <a:avLst/>
-              </a:prstGeom>
-              <a:ln w="38100">
-                <a:solidFill>
-                  <a:schemeClr val="tx1"/>
-                </a:solidFill>
-                <a:headEnd type="none" w="med" len="med"/>
-                <a:tailEnd type="triangle" w="med" len="med"/>
-              </a:ln>
-            </p:spPr>
-            <p:style>
-              <a:lnRef idx="1">
-                <a:schemeClr val="accent1"/>
-              </a:lnRef>
-              <a:fillRef idx="0">
-                <a:schemeClr val="accent1"/>
-              </a:fillRef>
-              <a:effectRef idx="0">
-                <a:schemeClr val="accent1"/>
-              </a:effectRef>
-              <a:fontRef idx="minor">
-                <a:schemeClr val="tx1"/>
-              </a:fontRef>
-            </p:style>
-          </p:cxnSp>
-          <p:cxnSp>
-            <p:nvCxnSpPr>
-              <p:cNvPr id="41" name="Straight Arrow Connector 40">
-                <a:extLst>
-                  <a:ext uri="{FF2B5EF4-FFF2-40B4-BE49-F238E27FC236}">
-                    <a16:creationId xmlns:a16="http://schemas.microsoft.com/office/drawing/2014/main" id="{EA9B8247-B563-2C47-98E1-B9CAE5F8A5EE}"/>
-                  </a:ext>
-                </a:extLst>
-              </p:cNvPr>
-              <p:cNvCxnSpPr>
-                <a:cxnSpLocks/>
-              </p:cNvCxnSpPr>
-              <p:nvPr/>
-            </p:nvCxnSpPr>
-            <p:spPr>
-              <a:xfrm flipH="1">
-                <a:off x="3860147" y="2467282"/>
-                <a:ext cx="1491260" cy="1226051"/>
-              </a:xfrm>
-              <a:prstGeom prst="straightConnector1">
-                <a:avLst/>
-              </a:prstGeom>
-              <a:ln w="38100">
-                <a:solidFill>
-                  <a:schemeClr val="tx1"/>
-                </a:solidFill>
-                <a:headEnd type="triangle" w="med" len="med"/>
-                <a:tailEnd type="none" w="med" len="med"/>
-              </a:ln>
-            </p:spPr>
-            <p:style>
-              <a:lnRef idx="1">
-                <a:schemeClr val="accent1"/>
-              </a:lnRef>
-              <a:fillRef idx="0">
-                <a:schemeClr val="accent1"/>
-              </a:fillRef>
-              <a:effectRef idx="0">
-                <a:schemeClr val="accent1"/>
-              </a:effectRef>
-              <a:fontRef idx="minor">
-                <a:schemeClr val="tx1"/>
-              </a:fontRef>
-            </p:style>
-          </p:cxnSp>
-          <p:cxnSp>
-            <p:nvCxnSpPr>
-              <p:cNvPr id="42" name="Straight Arrow Connector 41">
-                <a:extLst>
-                  <a:ext uri="{FF2B5EF4-FFF2-40B4-BE49-F238E27FC236}">
-                    <a16:creationId xmlns:a16="http://schemas.microsoft.com/office/drawing/2014/main" id="{AA7D0DEA-BA78-754D-914C-A56B3E3FEA7B}"/>
-                  </a:ext>
-                </a:extLst>
-              </p:cNvPr>
-              <p:cNvCxnSpPr>
-                <a:cxnSpLocks/>
-              </p:cNvCxnSpPr>
-              <p:nvPr/>
-            </p:nvCxnSpPr>
-            <p:spPr>
-              <a:xfrm>
-                <a:off x="6593508" y="2476320"/>
-                <a:ext cx="1527845" cy="1211929"/>
-              </a:xfrm>
-              <a:prstGeom prst="straightConnector1">
-                <a:avLst/>
-              </a:prstGeom>
-              <a:ln w="38100">
-                <a:solidFill>
-                  <a:schemeClr val="tx1"/>
-                </a:solidFill>
-                <a:headEnd type="triangle" w="med" len="med"/>
-                <a:tailEnd type="none" w="med" len="med"/>
-              </a:ln>
-            </p:spPr>
-            <p:style>
-              <a:lnRef idx="1">
-                <a:schemeClr val="accent1"/>
-              </a:lnRef>
-              <a:fillRef idx="0">
-                <a:schemeClr val="accent1"/>
-              </a:fillRef>
-              <a:effectRef idx="0">
-                <a:schemeClr val="accent1"/>
-              </a:effectRef>
-              <a:fontRef idx="minor">
-                <a:schemeClr val="tx1"/>
-              </a:fontRef>
-            </p:style>
-          </p:cxnSp>
-          <p:sp>
-            <p:nvSpPr>
-              <p:cNvPr id="10" name="Rounded Rectangle 9">
-                <a:extLst>
-                  <a:ext uri="{FF2B5EF4-FFF2-40B4-BE49-F238E27FC236}">
-                    <a16:creationId xmlns:a16="http://schemas.microsoft.com/office/drawing/2014/main" id="{9665DD76-FB60-9949-A2BC-E3AE99E193A3}"/>
-                  </a:ext>
-                </a:extLst>
-              </p:cNvPr>
-              <p:cNvSpPr/>
-              <p:nvPr/>
-            </p:nvSpPr>
-            <p:spPr>
-              <a:xfrm>
-                <a:off x="5349349" y="2037403"/>
-                <a:ext cx="1272321" cy="439873"/>
-              </a:xfrm>
-              <a:prstGeom prst="roundRect">
-                <a:avLst/>
-              </a:prstGeom>
-              <a:ln w="38100"/>
-            </p:spPr>
-            <p:style>
-              <a:lnRef idx="2">
-                <a:schemeClr val="dk1"/>
-              </a:lnRef>
-              <a:fillRef idx="1">
-                <a:schemeClr val="lt1"/>
-              </a:fillRef>
-              <a:effectRef idx="0">
-                <a:schemeClr val="dk1"/>
-              </a:effectRef>
-              <a:fontRef idx="minor">
-                <a:schemeClr val="dk1"/>
-              </a:fontRef>
-            </p:style>
-            <p:txBody>
-              <a:bodyPr rtlCol="0" anchor="ctr"/>
-              <a:lstStyle/>
-              <a:p>
-                <a:pPr algn="ctr"/>
-                <a:r>
-                  <a:rPr lang="en-US" dirty="0"/>
-                  <a:t>Road</a:t>
-                </a:r>
-              </a:p>
-            </p:txBody>
-          </p:sp>
-          <p:sp>
-            <p:nvSpPr>
-              <p:cNvPr id="50" name="TextBox 49">
-                <a:extLst>
-                  <a:ext uri="{FF2B5EF4-FFF2-40B4-BE49-F238E27FC236}">
-                    <a16:creationId xmlns:a16="http://schemas.microsoft.com/office/drawing/2014/main" id="{EF191CAD-2B0E-634D-91AC-44C037F9E1A9}"/>
-                  </a:ext>
-                </a:extLst>
-              </p:cNvPr>
-              <p:cNvSpPr txBox="1"/>
-              <p:nvPr/>
-            </p:nvSpPr>
-            <p:spPr>
-              <a:xfrm>
-                <a:off x="5258690" y="5024335"/>
-                <a:ext cx="450764" cy="369332"/>
-              </a:xfrm>
-              <a:prstGeom prst="rect">
-                <a:avLst/>
-              </a:prstGeom>
-              <a:noFill/>
-            </p:spPr>
-            <p:txBody>
-              <a:bodyPr wrap="none" rtlCol="0">
-                <a:spAutoFit/>
-              </a:bodyPr>
-              <a:lstStyle/>
-              <a:p>
-                <a:r>
-                  <a:rPr lang="en-US" dirty="0"/>
-                  <a:t>DC</a:t>
-                </a:r>
-              </a:p>
-            </p:txBody>
-          </p:sp>
-          <p:sp>
-            <p:nvSpPr>
-              <p:cNvPr id="51" name="TextBox 50">
-                <a:extLst>
-                  <a:ext uri="{FF2B5EF4-FFF2-40B4-BE49-F238E27FC236}">
-                    <a16:creationId xmlns:a16="http://schemas.microsoft.com/office/drawing/2014/main" id="{BE157556-26C9-8446-9152-BE8EED6ECA40}"/>
-                  </a:ext>
-                </a:extLst>
-              </p:cNvPr>
-              <p:cNvSpPr txBox="1"/>
-              <p:nvPr/>
-            </p:nvSpPr>
-            <p:spPr>
-              <a:xfrm>
-                <a:off x="3467973" y="4553403"/>
-                <a:ext cx="534121" cy="369332"/>
-              </a:xfrm>
-              <a:prstGeom prst="rect">
-                <a:avLst/>
-              </a:prstGeom>
-              <a:noFill/>
-            </p:spPr>
-            <p:txBody>
-              <a:bodyPr wrap="none" rtlCol="0">
-                <a:spAutoFit/>
-              </a:bodyPr>
-              <a:lstStyle/>
-              <a:p>
-                <a:r>
-                  <a:rPr lang="en-US" dirty="0">
-                    <a:solidFill>
-                      <a:srgbClr val="FF0000"/>
-                    </a:solidFill>
-                  </a:rPr>
-                  <a:t>TPP</a:t>
-                </a:r>
-              </a:p>
-            </p:txBody>
-          </p:sp>
-          <p:sp>
-            <p:nvSpPr>
-              <p:cNvPr id="52" name="TextBox 51">
-                <a:extLst>
-                  <a:ext uri="{FF2B5EF4-FFF2-40B4-BE49-F238E27FC236}">
-                    <a16:creationId xmlns:a16="http://schemas.microsoft.com/office/drawing/2014/main" id="{0548B6EC-FFCF-B846-9DD8-A27CCCA2B1DA}"/>
-                  </a:ext>
-                </a:extLst>
-              </p:cNvPr>
-              <p:cNvSpPr txBox="1"/>
-              <p:nvPr/>
-            </p:nvSpPr>
-            <p:spPr>
-              <a:xfrm rot="19966229">
-                <a:off x="5074607" y="4570329"/>
-                <a:ext cx="417615" cy="369332"/>
-              </a:xfrm>
-              <a:prstGeom prst="rect">
-                <a:avLst/>
-              </a:prstGeom>
-              <a:noFill/>
-            </p:spPr>
-            <p:txBody>
-              <a:bodyPr wrap="none" rtlCol="0">
-                <a:spAutoFit/>
-              </a:bodyPr>
-              <a:lstStyle/>
-              <a:p>
-                <a:r>
-                  <a:rPr lang="en-US" dirty="0">
-                    <a:solidFill>
-                      <a:srgbClr val="FF0000"/>
-                    </a:solidFill>
-                  </a:rPr>
-                  <a:t>EC</a:t>
-                </a:r>
-              </a:p>
-            </p:txBody>
-          </p:sp>
-          <p:sp>
-            <p:nvSpPr>
-              <p:cNvPr id="53" name="TextBox 52">
-                <a:extLst>
-                  <a:ext uri="{FF2B5EF4-FFF2-40B4-BE49-F238E27FC236}">
-                    <a16:creationId xmlns:a16="http://schemas.microsoft.com/office/drawing/2014/main" id="{46D38238-221A-A54A-86AA-AF0AED500DB4}"/>
-                  </a:ext>
-                </a:extLst>
-              </p:cNvPr>
-              <p:cNvSpPr txBox="1"/>
-              <p:nvPr/>
-            </p:nvSpPr>
-            <p:spPr>
-              <a:xfrm>
-                <a:off x="4413123" y="4500895"/>
-                <a:ext cx="417615" cy="369332"/>
-              </a:xfrm>
-              <a:prstGeom prst="rect">
-                <a:avLst/>
-              </a:prstGeom>
-              <a:noFill/>
-            </p:spPr>
-            <p:txBody>
-              <a:bodyPr wrap="none" rtlCol="0">
-                <a:spAutoFit/>
-              </a:bodyPr>
-              <a:lstStyle/>
-              <a:p>
-                <a:r>
-                  <a:rPr lang="en-US" dirty="0"/>
-                  <a:t>EC</a:t>
-                </a:r>
-              </a:p>
-            </p:txBody>
-          </p:sp>
-          <p:sp>
-            <p:nvSpPr>
-              <p:cNvPr id="54" name="TextBox 53">
-                <a:extLst>
-                  <a:ext uri="{FF2B5EF4-FFF2-40B4-BE49-F238E27FC236}">
-                    <a16:creationId xmlns:a16="http://schemas.microsoft.com/office/drawing/2014/main" id="{3CC797EB-7D55-6D4D-B7BC-C2A989BF3E68}"/>
-                  </a:ext>
-                </a:extLst>
-              </p:cNvPr>
-              <p:cNvSpPr txBox="1"/>
-              <p:nvPr/>
-            </p:nvSpPr>
-            <p:spPr>
-              <a:xfrm>
-                <a:off x="5746970" y="3292471"/>
-                <a:ext cx="417615" cy="369332"/>
-              </a:xfrm>
-              <a:prstGeom prst="rect">
-                <a:avLst/>
-              </a:prstGeom>
-              <a:noFill/>
-            </p:spPr>
-            <p:txBody>
-              <a:bodyPr wrap="none" rtlCol="0">
-                <a:spAutoFit/>
-              </a:bodyPr>
-              <a:lstStyle/>
-              <a:p>
-                <a:r>
-                  <a:rPr lang="en-US" dirty="0">
-                    <a:solidFill>
-                      <a:srgbClr val="FF0000"/>
-                    </a:solidFill>
-                  </a:rPr>
-                  <a:t>EC</a:t>
-                </a:r>
-              </a:p>
-            </p:txBody>
-          </p:sp>
-          <p:sp>
-            <p:nvSpPr>
-              <p:cNvPr id="55" name="TextBox 54">
-                <a:extLst>
-                  <a:ext uri="{FF2B5EF4-FFF2-40B4-BE49-F238E27FC236}">
-                    <a16:creationId xmlns:a16="http://schemas.microsoft.com/office/drawing/2014/main" id="{1A64633F-C130-C640-A3A6-D5CBCE809420}"/>
-                  </a:ext>
-                </a:extLst>
-              </p:cNvPr>
-              <p:cNvSpPr txBox="1"/>
-              <p:nvPr/>
-            </p:nvSpPr>
-            <p:spPr>
-              <a:xfrm>
-                <a:off x="7725958" y="4626001"/>
-                <a:ext cx="683200" cy="369332"/>
-              </a:xfrm>
-              <a:prstGeom prst="rect">
-                <a:avLst/>
-              </a:prstGeom>
-              <a:noFill/>
-            </p:spPr>
-            <p:txBody>
-              <a:bodyPr wrap="none" rtlCol="0">
-                <a:spAutoFit/>
-              </a:bodyPr>
-              <a:lstStyle/>
-              <a:p>
-                <a:r>
-                  <a:rPr lang="en-US" dirty="0"/>
-                  <a:t>NTPP</a:t>
-                </a:r>
-              </a:p>
-            </p:txBody>
-          </p:sp>
-          <p:sp>
-            <p:nvSpPr>
-              <p:cNvPr id="56" name="TextBox 55">
-                <a:extLst>
-                  <a:ext uri="{FF2B5EF4-FFF2-40B4-BE49-F238E27FC236}">
-                    <a16:creationId xmlns:a16="http://schemas.microsoft.com/office/drawing/2014/main" id="{75406E95-B618-A94E-89A2-2C72C18427C3}"/>
-                  </a:ext>
-                </a:extLst>
-              </p:cNvPr>
-              <p:cNvSpPr txBox="1"/>
-              <p:nvPr/>
-            </p:nvSpPr>
-            <p:spPr>
-              <a:xfrm>
-                <a:off x="7136166" y="4497201"/>
-                <a:ext cx="417615" cy="369332"/>
-              </a:xfrm>
-              <a:prstGeom prst="rect">
-                <a:avLst/>
-              </a:prstGeom>
-              <a:noFill/>
-            </p:spPr>
-            <p:txBody>
-              <a:bodyPr wrap="none" rtlCol="0">
-                <a:spAutoFit/>
-              </a:bodyPr>
-              <a:lstStyle/>
-              <a:p>
-                <a:r>
-                  <a:rPr lang="en-US" dirty="0"/>
-                  <a:t>EC</a:t>
-                </a:r>
-              </a:p>
-            </p:txBody>
-          </p:sp>
-          <p:sp>
-            <p:nvSpPr>
-              <p:cNvPr id="57" name="TextBox 56">
-                <a:extLst>
-                  <a:ext uri="{FF2B5EF4-FFF2-40B4-BE49-F238E27FC236}">
-                    <a16:creationId xmlns:a16="http://schemas.microsoft.com/office/drawing/2014/main" id="{98DA7FDF-DBE3-5A4C-9C83-ADCBCF88C818}"/>
-                  </a:ext>
-                </a:extLst>
-              </p:cNvPr>
-              <p:cNvSpPr txBox="1"/>
-              <p:nvPr/>
-            </p:nvSpPr>
-            <p:spPr>
-              <a:xfrm rot="1563311">
-                <a:off x="6455026" y="4588524"/>
-                <a:ext cx="450764" cy="369332"/>
-              </a:xfrm>
-              <a:prstGeom prst="rect">
-                <a:avLst/>
-              </a:prstGeom>
-              <a:noFill/>
-            </p:spPr>
-            <p:txBody>
-              <a:bodyPr wrap="none" rtlCol="0">
-                <a:spAutoFit/>
-              </a:bodyPr>
-              <a:lstStyle/>
-              <a:p>
-                <a:r>
-                  <a:rPr lang="en-US" dirty="0"/>
-                  <a:t>DC</a:t>
-                </a:r>
-                <a:endParaRPr lang="en-US" strike="sngStrike" dirty="0"/>
-              </a:p>
-            </p:txBody>
-          </p:sp>
-          <p:sp>
-            <p:nvSpPr>
-              <p:cNvPr id="58" name="TextBox 57">
-                <a:extLst>
-                  <a:ext uri="{FF2B5EF4-FFF2-40B4-BE49-F238E27FC236}">
-                    <a16:creationId xmlns:a16="http://schemas.microsoft.com/office/drawing/2014/main" id="{922076C1-90FF-9345-9773-416229AB1CDE}"/>
-                  </a:ext>
-                </a:extLst>
-              </p:cNvPr>
-              <p:cNvSpPr txBox="1"/>
-              <p:nvPr/>
-            </p:nvSpPr>
-            <p:spPr>
-              <a:xfrm>
-                <a:off x="4252012" y="2605811"/>
-                <a:ext cx="417615" cy="369332"/>
-              </a:xfrm>
-              <a:prstGeom prst="rect">
-                <a:avLst/>
-              </a:prstGeom>
-              <a:noFill/>
-            </p:spPr>
-            <p:txBody>
-              <a:bodyPr wrap="none" rtlCol="0">
-                <a:spAutoFit/>
-              </a:bodyPr>
-              <a:lstStyle/>
-              <a:p>
-                <a:r>
-                  <a:rPr lang="en-US" dirty="0">
-                    <a:solidFill>
-                      <a:srgbClr val="FF0000"/>
-                    </a:solidFill>
-                  </a:rPr>
-                  <a:t>EC</a:t>
-                </a:r>
-              </a:p>
-            </p:txBody>
-          </p:sp>
-          <p:sp>
-            <p:nvSpPr>
-              <p:cNvPr id="60" name="TextBox 59">
-                <a:extLst>
-                  <a:ext uri="{FF2B5EF4-FFF2-40B4-BE49-F238E27FC236}">
-                    <a16:creationId xmlns:a16="http://schemas.microsoft.com/office/drawing/2014/main" id="{5BF8C4A2-1436-CB41-B5EE-6BD419659278}"/>
-                  </a:ext>
-                </a:extLst>
-              </p:cNvPr>
-              <p:cNvSpPr txBox="1"/>
-              <p:nvPr/>
-            </p:nvSpPr>
-            <p:spPr>
-              <a:xfrm>
-                <a:off x="7293407" y="2584271"/>
-                <a:ext cx="455574" cy="369332"/>
-              </a:xfrm>
-              <a:prstGeom prst="rect">
-                <a:avLst/>
-              </a:prstGeom>
-              <a:noFill/>
-            </p:spPr>
-            <p:txBody>
-              <a:bodyPr wrap="none" rtlCol="0">
-                <a:spAutoFit/>
-              </a:bodyPr>
-              <a:lstStyle/>
-              <a:p>
-                <a:r>
-                  <a:rPr lang="en-US" dirty="0">
-                    <a:solidFill>
-                      <a:srgbClr val="FF0000"/>
-                    </a:solidFill>
-                  </a:rPr>
-                  <a:t>PO</a:t>
-                </a:r>
-              </a:p>
-            </p:txBody>
-          </p:sp>
-          <p:sp>
-            <p:nvSpPr>
-              <p:cNvPr id="47" name="Oval 46">
-                <a:extLst>
-                  <a:ext uri="{FF2B5EF4-FFF2-40B4-BE49-F238E27FC236}">
-                    <a16:creationId xmlns:a16="http://schemas.microsoft.com/office/drawing/2014/main" id="{235A931C-E2CC-714F-8762-83D8A187C2F8}"/>
-                  </a:ext>
-                </a:extLst>
-              </p:cNvPr>
-              <p:cNvSpPr/>
-              <p:nvPr/>
-            </p:nvSpPr>
-            <p:spPr>
-              <a:xfrm>
-                <a:off x="5905511" y="4531039"/>
-                <a:ext cx="150828" cy="150828"/>
-              </a:xfrm>
-              <a:prstGeom prst="ellipse">
-                <a:avLst/>
-              </a:prstGeom>
-              <a:solidFill>
-                <a:schemeClr val="bg1"/>
-              </a:solidFill>
-              <a:ln>
-                <a:noFill/>
-              </a:ln>
-            </p:spPr>
-            <p:style>
-              <a:lnRef idx="2">
-                <a:schemeClr val="accent1">
-                  <a:shade val="50000"/>
-                </a:schemeClr>
-              </a:lnRef>
-              <a:fillRef idx="1">
-                <a:schemeClr val="accent1"/>
-              </a:fillRef>
-              <a:effectRef idx="0">
-                <a:schemeClr val="accent1"/>
-              </a:effectRef>
-              <a:fontRef idx="minor">
-                <a:schemeClr val="lt1"/>
-              </a:fontRef>
-            </p:style>
-            <p:txBody>
-              <a:bodyPr rtlCol="0" anchor="ctr"/>
-              <a:lstStyle/>
-              <a:p>
-                <a:pPr algn="ctr"/>
-                <a:endParaRPr lang="en-US"/>
-              </a:p>
-            </p:txBody>
-          </p:sp>
-          <p:sp>
-            <p:nvSpPr>
-              <p:cNvPr id="7" name="Rounded Rectangle 6">
-                <a:extLst>
-                  <a:ext uri="{FF2B5EF4-FFF2-40B4-BE49-F238E27FC236}">
-                    <a16:creationId xmlns:a16="http://schemas.microsoft.com/office/drawing/2014/main" id="{3CC7A131-3377-5B44-8F29-319A6C7F5B5D}"/>
-                  </a:ext>
-                </a:extLst>
-              </p:cNvPr>
-              <p:cNvSpPr/>
-              <p:nvPr/>
-            </p:nvSpPr>
-            <p:spPr>
-              <a:xfrm>
-                <a:off x="3223987" y="3438536"/>
-                <a:ext cx="1272321" cy="439873"/>
-              </a:xfrm>
-              <a:prstGeom prst="roundRect">
-                <a:avLst/>
-              </a:prstGeom>
-              <a:ln w="38100"/>
-            </p:spPr>
-            <p:style>
-              <a:lnRef idx="2">
-                <a:schemeClr val="dk1"/>
-              </a:lnRef>
-              <a:fillRef idx="1">
-                <a:schemeClr val="lt1"/>
-              </a:fillRef>
-              <a:effectRef idx="0">
-                <a:schemeClr val="dk1"/>
-              </a:effectRef>
-              <a:fontRef idx="minor">
-                <a:schemeClr val="dk1"/>
-              </a:fontRef>
-            </p:style>
-            <p:txBody>
-              <a:bodyPr rtlCol="0" anchor="ctr"/>
-              <a:lstStyle/>
-              <a:p>
-                <a:pPr algn="ctr"/>
-                <a:r>
-                  <a:rPr lang="en-US" dirty="0"/>
-                  <a:t>Property1</a:t>
-                </a:r>
-              </a:p>
-            </p:txBody>
-          </p:sp>
-          <p:sp>
-            <p:nvSpPr>
-              <p:cNvPr id="9" name="Rounded Rectangle 8">
-                <a:extLst>
-                  <a:ext uri="{FF2B5EF4-FFF2-40B4-BE49-F238E27FC236}">
-                    <a16:creationId xmlns:a16="http://schemas.microsoft.com/office/drawing/2014/main" id="{2AE7E888-8CF5-F544-B2CC-3BF5A206EA8E}"/>
-                  </a:ext>
-                </a:extLst>
-              </p:cNvPr>
-              <p:cNvSpPr/>
-              <p:nvPr/>
-            </p:nvSpPr>
-            <p:spPr>
-              <a:xfrm>
-                <a:off x="7474712" y="3444714"/>
-                <a:ext cx="1272321" cy="439873"/>
-              </a:xfrm>
-              <a:prstGeom prst="roundRect">
-                <a:avLst/>
-              </a:prstGeom>
-              <a:ln w="38100"/>
-            </p:spPr>
-            <p:style>
-              <a:lnRef idx="2">
-                <a:schemeClr val="dk1"/>
-              </a:lnRef>
-              <a:fillRef idx="1">
-                <a:schemeClr val="lt1"/>
-              </a:fillRef>
-              <a:effectRef idx="0">
-                <a:schemeClr val="dk1"/>
-              </a:effectRef>
-              <a:fontRef idx="minor">
-                <a:schemeClr val="dk1"/>
-              </a:fontRef>
-            </p:style>
-            <p:txBody>
-              <a:bodyPr rtlCol="0" anchor="ctr"/>
-              <a:lstStyle/>
-              <a:p>
-                <a:pPr algn="ctr"/>
-                <a:r>
-                  <a:rPr lang="en-US" dirty="0"/>
-                  <a:t>Property2</a:t>
-                </a:r>
-              </a:p>
-            </p:txBody>
-          </p:sp>
-          <p:sp>
-            <p:nvSpPr>
-              <p:cNvPr id="44" name="Oval 43">
-                <a:extLst>
-                  <a:ext uri="{FF2B5EF4-FFF2-40B4-BE49-F238E27FC236}">
-                    <a16:creationId xmlns:a16="http://schemas.microsoft.com/office/drawing/2014/main" id="{468B9810-E043-954D-A0C3-B45BE01F852F}"/>
-                  </a:ext>
-                </a:extLst>
-              </p:cNvPr>
-              <p:cNvSpPr/>
-              <p:nvPr/>
-            </p:nvSpPr>
-            <p:spPr>
-              <a:xfrm>
-                <a:off x="6574654" y="3586246"/>
-                <a:ext cx="150828" cy="150828"/>
-              </a:xfrm>
-              <a:prstGeom prst="ellipse">
-                <a:avLst/>
-              </a:prstGeom>
-              <a:solidFill>
-                <a:schemeClr val="bg1"/>
-              </a:solidFill>
-              <a:ln>
-                <a:noFill/>
-              </a:ln>
-            </p:spPr>
-            <p:style>
-              <a:lnRef idx="2">
-                <a:schemeClr val="accent1">
-                  <a:shade val="50000"/>
-                </a:schemeClr>
-              </a:lnRef>
-              <a:fillRef idx="1">
-                <a:schemeClr val="accent1"/>
-              </a:fillRef>
-              <a:effectRef idx="0">
-                <a:schemeClr val="accent1"/>
-              </a:effectRef>
-              <a:fontRef idx="minor">
-                <a:schemeClr val="lt1"/>
-              </a:fontRef>
-            </p:style>
-            <p:txBody>
-              <a:bodyPr rtlCol="0" anchor="ctr"/>
-              <a:lstStyle/>
-              <a:p>
-                <a:pPr algn="ctr"/>
-                <a:endParaRPr lang="en-US"/>
-              </a:p>
-            </p:txBody>
-          </p:sp>
-          <p:sp>
-            <p:nvSpPr>
-              <p:cNvPr id="45" name="Oval 44">
-                <a:extLst>
-                  <a:ext uri="{FF2B5EF4-FFF2-40B4-BE49-F238E27FC236}">
-                    <a16:creationId xmlns:a16="http://schemas.microsoft.com/office/drawing/2014/main" id="{9895FE1C-0F98-BC4B-9A24-2B34C78A39EA}"/>
-                  </a:ext>
-                </a:extLst>
-              </p:cNvPr>
-              <p:cNvSpPr/>
-              <p:nvPr/>
-            </p:nvSpPr>
-            <p:spPr>
-              <a:xfrm>
-                <a:off x="5228184" y="3586246"/>
-                <a:ext cx="150828" cy="150828"/>
-              </a:xfrm>
-              <a:prstGeom prst="ellipse">
-                <a:avLst/>
-              </a:prstGeom>
-              <a:solidFill>
-                <a:schemeClr val="bg1"/>
-              </a:solidFill>
-              <a:ln>
-                <a:noFill/>
-              </a:ln>
-            </p:spPr>
-            <p:style>
-              <a:lnRef idx="2">
-                <a:schemeClr val="accent1">
-                  <a:shade val="50000"/>
-                </a:schemeClr>
-              </a:lnRef>
-              <a:fillRef idx="1">
-                <a:schemeClr val="accent1"/>
-              </a:fillRef>
-              <a:effectRef idx="0">
-                <a:schemeClr val="accent1"/>
-              </a:effectRef>
-              <a:fontRef idx="minor">
-                <a:schemeClr val="lt1"/>
-              </a:fontRef>
-            </p:style>
-            <p:txBody>
-              <a:bodyPr rtlCol="0" anchor="ctr"/>
-              <a:lstStyle/>
-              <a:p>
-                <a:pPr algn="ctr"/>
-                <a:endParaRPr lang="en-US"/>
-              </a:p>
-            </p:txBody>
-          </p:sp>
-          <p:sp>
-            <p:nvSpPr>
-              <p:cNvPr id="46" name="Oval 45">
-                <a:extLst>
-                  <a:ext uri="{FF2B5EF4-FFF2-40B4-BE49-F238E27FC236}">
-                    <a16:creationId xmlns:a16="http://schemas.microsoft.com/office/drawing/2014/main" id="{5AF8BE8F-BA22-8B41-BD6C-5A0BAA2AF665}"/>
-                  </a:ext>
-                </a:extLst>
-              </p:cNvPr>
-              <p:cNvSpPr/>
-              <p:nvPr/>
-            </p:nvSpPr>
-            <p:spPr>
-              <a:xfrm>
-                <a:off x="6809417" y="4063000"/>
-                <a:ext cx="150828" cy="150828"/>
-              </a:xfrm>
-              <a:prstGeom prst="ellipse">
-                <a:avLst/>
-              </a:prstGeom>
-              <a:solidFill>
-                <a:schemeClr val="bg1"/>
-              </a:solidFill>
-              <a:ln>
-                <a:noFill/>
-              </a:ln>
-            </p:spPr>
-            <p:style>
-              <a:lnRef idx="2">
-                <a:schemeClr val="accent1">
-                  <a:shade val="50000"/>
-                </a:schemeClr>
-              </a:lnRef>
-              <a:fillRef idx="1">
-                <a:schemeClr val="accent1"/>
-              </a:fillRef>
-              <a:effectRef idx="0">
-                <a:schemeClr val="accent1"/>
-              </a:effectRef>
-              <a:fontRef idx="minor">
-                <a:schemeClr val="lt1"/>
-              </a:fontRef>
-            </p:style>
-            <p:txBody>
-              <a:bodyPr rtlCol="0" anchor="ctr"/>
-              <a:lstStyle/>
-              <a:p>
-                <a:pPr algn="ctr"/>
-                <a:endParaRPr lang="en-US"/>
-              </a:p>
-            </p:txBody>
-          </p:sp>
-          <p:cxnSp>
-            <p:nvCxnSpPr>
-              <p:cNvPr id="15" name="Straight Arrow Connector 14">
-                <a:extLst>
-                  <a:ext uri="{FF2B5EF4-FFF2-40B4-BE49-F238E27FC236}">
-                    <a16:creationId xmlns:a16="http://schemas.microsoft.com/office/drawing/2014/main" id="{87C9CEA4-1399-8B47-8048-49E15D3B0668}"/>
-                  </a:ext>
-                </a:extLst>
-              </p:cNvPr>
-              <p:cNvCxnSpPr>
-                <a:cxnSpLocks/>
-              </p:cNvCxnSpPr>
-              <p:nvPr/>
-            </p:nvCxnSpPr>
-            <p:spPr>
-              <a:xfrm flipV="1">
-                <a:off x="4496306" y="2477276"/>
-                <a:ext cx="1380758" cy="2896318"/>
-              </a:xfrm>
-              <a:prstGeom prst="straightConnector1">
-                <a:avLst/>
-              </a:prstGeom>
-              <a:ln w="38100">
-                <a:solidFill>
-                  <a:schemeClr val="tx1"/>
-                </a:solidFill>
-                <a:headEnd type="none" w="med" len="med"/>
-                <a:tailEnd type="triangle" w="med" len="med"/>
-              </a:ln>
-            </p:spPr>
-            <p:style>
-              <a:lnRef idx="1">
-                <a:schemeClr val="accent1"/>
-              </a:lnRef>
-              <a:fillRef idx="0">
-                <a:schemeClr val="accent1"/>
-              </a:fillRef>
-              <a:effectRef idx="0">
-                <a:schemeClr val="accent1"/>
-              </a:effectRef>
-              <a:fontRef idx="minor">
-                <a:schemeClr val="tx1"/>
-              </a:fontRef>
-            </p:style>
-          </p:cxnSp>
-          <p:sp>
-            <p:nvSpPr>
-              <p:cNvPr id="48" name="Oval 47">
-                <a:extLst>
-                  <a:ext uri="{FF2B5EF4-FFF2-40B4-BE49-F238E27FC236}">
-                    <a16:creationId xmlns:a16="http://schemas.microsoft.com/office/drawing/2014/main" id="{550BECEF-CD7C-254F-9A2A-BEFF0CEC79B7}"/>
-                  </a:ext>
-                </a:extLst>
-              </p:cNvPr>
-              <p:cNvSpPr/>
-              <p:nvPr/>
-            </p:nvSpPr>
-            <p:spPr>
-              <a:xfrm>
-                <a:off x="5000492" y="4068765"/>
-                <a:ext cx="150828" cy="150828"/>
-              </a:xfrm>
-              <a:prstGeom prst="ellipse">
-                <a:avLst/>
-              </a:prstGeom>
-              <a:solidFill>
-                <a:schemeClr val="bg1"/>
-              </a:solidFill>
-              <a:ln>
-                <a:noFill/>
-              </a:ln>
-            </p:spPr>
-            <p:style>
-              <a:lnRef idx="2">
-                <a:schemeClr val="accent1">
-                  <a:shade val="50000"/>
-                </a:schemeClr>
-              </a:lnRef>
-              <a:fillRef idx="1">
-                <a:schemeClr val="accent1"/>
-              </a:fillRef>
-              <a:effectRef idx="0">
-                <a:schemeClr val="accent1"/>
-              </a:effectRef>
-              <a:fontRef idx="minor">
-                <a:schemeClr val="lt1"/>
-              </a:fontRef>
-            </p:style>
-            <p:txBody>
-              <a:bodyPr rtlCol="0" anchor="ctr"/>
-              <a:lstStyle/>
-              <a:p>
-                <a:pPr algn="ctr"/>
-                <a:endParaRPr lang="en-US"/>
-              </a:p>
-            </p:txBody>
-          </p:sp>
-          <p:cxnSp>
-            <p:nvCxnSpPr>
-              <p:cNvPr id="35" name="Straight Arrow Connector 34">
-                <a:extLst>
-                  <a:ext uri="{FF2B5EF4-FFF2-40B4-BE49-F238E27FC236}">
-                    <a16:creationId xmlns:a16="http://schemas.microsoft.com/office/drawing/2014/main" id="{F9A592B3-794D-6843-9750-659102B126F0}"/>
-                  </a:ext>
-                </a:extLst>
-              </p:cNvPr>
-              <p:cNvCxnSpPr>
-                <a:cxnSpLocks/>
-              </p:cNvCxnSpPr>
-              <p:nvPr/>
-            </p:nvCxnSpPr>
-            <p:spPr>
-              <a:xfrm flipH="1" flipV="1">
-                <a:off x="6093952" y="2471717"/>
-                <a:ext cx="1380758" cy="2883505"/>
-              </a:xfrm>
-              <a:prstGeom prst="straightConnector1">
-                <a:avLst/>
-              </a:prstGeom>
-              <a:ln w="38100">
-                <a:solidFill>
-                  <a:schemeClr val="tx1"/>
-                </a:solidFill>
-                <a:headEnd type="none" w="med" len="med"/>
-                <a:tailEnd type="triangle" w="med" len="med"/>
-              </a:ln>
-            </p:spPr>
-            <p:style>
-              <a:lnRef idx="1">
-                <a:schemeClr val="accent1"/>
-              </a:lnRef>
-              <a:fillRef idx="0">
-                <a:schemeClr val="accent1"/>
-              </a:fillRef>
-              <a:effectRef idx="0">
-                <a:schemeClr val="accent1"/>
-              </a:effectRef>
-              <a:fontRef idx="minor">
-                <a:schemeClr val="tx1"/>
-              </a:fontRef>
-            </p:style>
-          </p:cxnSp>
-          <p:cxnSp>
-            <p:nvCxnSpPr>
-              <p:cNvPr id="16" name="Straight Arrow Connector 15">
-                <a:extLst>
-                  <a:ext uri="{FF2B5EF4-FFF2-40B4-BE49-F238E27FC236}">
-                    <a16:creationId xmlns:a16="http://schemas.microsoft.com/office/drawing/2014/main" id="{3188ECC1-634F-7046-B38F-C17C28CBEB81}"/>
-                  </a:ext>
-                </a:extLst>
-              </p:cNvPr>
-              <p:cNvCxnSpPr>
-                <a:cxnSpLocks/>
-              </p:cNvCxnSpPr>
-              <p:nvPr/>
-            </p:nvCxnSpPr>
-            <p:spPr>
-              <a:xfrm flipH="1" flipV="1">
-                <a:off x="4496305" y="3857538"/>
-                <a:ext cx="2978405" cy="1497683"/>
-              </a:xfrm>
-              <a:prstGeom prst="straightConnector1">
-                <a:avLst/>
-              </a:prstGeom>
-              <a:ln w="38100">
-                <a:solidFill>
-                  <a:schemeClr val="tx1"/>
-                </a:solidFill>
-                <a:headEnd type="none" w="med" len="med"/>
-                <a:tailEnd type="triangle" w="med" len="med"/>
-              </a:ln>
-            </p:spPr>
-            <p:style>
-              <a:lnRef idx="1">
-                <a:schemeClr val="accent1"/>
-              </a:lnRef>
-              <a:fillRef idx="0">
-                <a:schemeClr val="accent1"/>
-              </a:fillRef>
-              <a:effectRef idx="0">
-                <a:schemeClr val="accent1"/>
-              </a:effectRef>
-              <a:fontRef idx="minor">
-                <a:schemeClr val="tx1"/>
-              </a:fontRef>
-            </p:style>
-          </p:cxnSp>
-          <p:sp>
-            <p:nvSpPr>
-              <p:cNvPr id="5" name="Rounded Rectangle 4">
-                <a:extLst>
-                  <a:ext uri="{FF2B5EF4-FFF2-40B4-BE49-F238E27FC236}">
-                    <a16:creationId xmlns:a16="http://schemas.microsoft.com/office/drawing/2014/main" id="{F30D2CC4-9187-5F42-B2B7-F16C0BE509F8}"/>
-                  </a:ext>
-                </a:extLst>
-              </p:cNvPr>
-              <p:cNvSpPr/>
-              <p:nvPr/>
-            </p:nvSpPr>
-            <p:spPr>
-              <a:xfrm>
-                <a:off x="3860147" y="5153657"/>
-                <a:ext cx="1272321" cy="439873"/>
-              </a:xfrm>
-              <a:prstGeom prst="roundRect">
-                <a:avLst/>
-              </a:prstGeom>
-              <a:ln w="38100"/>
-            </p:spPr>
-            <p:style>
-              <a:lnRef idx="2">
-                <a:schemeClr val="dk1"/>
-              </a:lnRef>
-              <a:fillRef idx="1">
-                <a:schemeClr val="lt1"/>
-              </a:fillRef>
-              <a:effectRef idx="0">
-                <a:schemeClr val="dk1"/>
-              </a:effectRef>
-              <a:fontRef idx="minor">
-                <a:schemeClr val="dk1"/>
-              </a:fontRef>
-            </p:style>
-            <p:txBody>
-              <a:bodyPr rtlCol="0" anchor="ctr"/>
-              <a:lstStyle/>
-              <a:p>
-                <a:pPr algn="ctr"/>
-                <a:r>
-                  <a:rPr lang="en-US" dirty="0"/>
-                  <a:t>House1</a:t>
-                </a:r>
-              </a:p>
-            </p:txBody>
-          </p:sp>
-          <p:sp>
-            <p:nvSpPr>
-              <p:cNvPr id="8" name="Rounded Rectangle 7">
-                <a:extLst>
-                  <a:ext uri="{FF2B5EF4-FFF2-40B4-BE49-F238E27FC236}">
-                    <a16:creationId xmlns:a16="http://schemas.microsoft.com/office/drawing/2014/main" id="{C21205AE-DB06-2449-8129-C475EF706134}"/>
-                  </a:ext>
-                </a:extLst>
-              </p:cNvPr>
-              <p:cNvSpPr/>
-              <p:nvPr/>
-            </p:nvSpPr>
-            <p:spPr>
-              <a:xfrm>
-                <a:off x="6838551" y="5138882"/>
-                <a:ext cx="1272321" cy="439873"/>
-              </a:xfrm>
-              <a:prstGeom prst="roundRect">
-                <a:avLst/>
-              </a:prstGeom>
-              <a:ln w="38100"/>
-            </p:spPr>
-            <p:style>
-              <a:lnRef idx="2">
-                <a:schemeClr val="dk1"/>
-              </a:lnRef>
-              <a:fillRef idx="1">
-                <a:schemeClr val="lt1"/>
-              </a:fillRef>
-              <a:effectRef idx="0">
-                <a:schemeClr val="dk1"/>
-              </a:effectRef>
-              <a:fontRef idx="minor">
-                <a:schemeClr val="dk1"/>
-              </a:fontRef>
-            </p:style>
-            <p:txBody>
-              <a:bodyPr rtlCol="0" anchor="ctr"/>
-              <a:lstStyle/>
-              <a:p>
-                <a:pPr algn="ctr"/>
-                <a:r>
-                  <a:rPr lang="en-US" dirty="0"/>
-                  <a:t>House2</a:t>
-                </a:r>
-              </a:p>
-            </p:txBody>
-          </p:sp>
-        </p:grpSp>
-        <p:sp>
-          <p:nvSpPr>
-            <p:cNvPr id="34" name="TextBox 33">
-              <a:extLst>
-                <a:ext uri="{FF2B5EF4-FFF2-40B4-BE49-F238E27FC236}">
-                  <a16:creationId xmlns:a16="http://schemas.microsoft.com/office/drawing/2014/main" id="{8BE01C8B-19A4-5A42-995D-A67FAEC636F9}"/>
-                </a:ext>
-              </a:extLst>
-            </p:cNvPr>
-            <p:cNvSpPr txBox="1"/>
-            <p:nvPr/>
-          </p:nvSpPr>
-          <p:spPr>
-            <a:xfrm>
-              <a:off x="5692314" y="3826237"/>
-              <a:ext cx="598241" cy="584775"/>
-            </a:xfrm>
-            <a:prstGeom prst="rect">
-              <a:avLst/>
-            </a:prstGeom>
-            <a:noFill/>
-          </p:spPr>
-          <p:txBody>
-            <a:bodyPr wrap="none" rtlCol="0">
-              <a:spAutoFit/>
-            </a:bodyPr>
-            <a:lstStyle/>
-            <a:p>
-              <a:r>
-                <a:rPr lang="en-US" sz="3200" dirty="0"/>
-                <a:t>#3</a:t>
-              </a:r>
-            </a:p>
-          </p:txBody>
-        </p:sp>
-      </p:grpSp>
+          <a:prstGeom prst="rect">
+            <a:avLst/>
+          </a:prstGeom>
+          <a:solidFill>
+            <a:srgbClr val="F4B183">
+              <a:alpha val="50196"/>
+            </a:srgbClr>
+          </a:solidFill>
+        </p:spPr>
+        <p:style>
+          <a:lnRef idx="2">
+            <a:schemeClr val="dk1"/>
+          </a:lnRef>
+          <a:fillRef idx="1">
+            <a:schemeClr val="lt1"/>
+          </a:fillRef>
+          <a:effectRef idx="0">
+            <a:schemeClr val="dk1"/>
+          </a:effectRef>
+          <a:fontRef idx="minor">
+            <a:schemeClr val="dk1"/>
+          </a:fontRef>
+        </p:style>
+        <p:txBody>
+          <a:bodyPr rtlCol="0" anchor="t" anchorCtr="0"/>
+          <a:lstStyle/>
+          <a:p>
+            <a:pPr algn="ctr"/>
+            <a:r>
+              <a:rPr lang="en-US" dirty="0"/>
+              <a:t>Property2</a:t>
+            </a:r>
+          </a:p>
+        </p:txBody>
+      </p:sp>
+      <p:sp>
+        <p:nvSpPr>
+          <p:cNvPr id="63" name="Rectangle 62">
+            <a:extLst>
+              <a:ext uri="{FF2B5EF4-FFF2-40B4-BE49-F238E27FC236}">
+                <a16:creationId xmlns:a16="http://schemas.microsoft.com/office/drawing/2014/main" id="{4B6111E3-B823-B541-A920-233040312EF0}"/>
+              </a:ext>
+            </a:extLst>
+          </p:cNvPr>
+          <p:cNvSpPr/>
+          <p:nvPr/>
+        </p:nvSpPr>
+        <p:spPr>
+          <a:xfrm>
+            <a:off x="8184593" y="3487964"/>
+            <a:ext cx="918829" cy="621598"/>
+          </a:xfrm>
+          <a:prstGeom prst="rect">
+            <a:avLst/>
+          </a:prstGeom>
+          <a:solidFill>
+            <a:srgbClr val="548235">
+              <a:alpha val="50196"/>
+            </a:srgbClr>
+          </a:solidFill>
+        </p:spPr>
+        <p:style>
+          <a:lnRef idx="2">
+            <a:schemeClr val="dk1"/>
+          </a:lnRef>
+          <a:fillRef idx="1">
+            <a:schemeClr val="lt1"/>
+          </a:fillRef>
+          <a:effectRef idx="0">
+            <a:schemeClr val="dk1"/>
+          </a:effectRef>
+          <a:fontRef idx="minor">
+            <a:schemeClr val="dk1"/>
+          </a:fontRef>
+        </p:style>
+        <p:txBody>
+          <a:bodyPr rtlCol="0" anchor="ctr" anchorCtr="0"/>
+          <a:lstStyle/>
+          <a:p>
+            <a:pPr algn="ctr"/>
+            <a:r>
+              <a:rPr lang="en-US" dirty="0"/>
+              <a:t>House1</a:t>
+            </a:r>
+          </a:p>
+        </p:txBody>
+      </p:sp>
+      <p:sp>
+        <p:nvSpPr>
+          <p:cNvPr id="64" name="Rectangle 63">
+            <a:extLst>
+              <a:ext uri="{FF2B5EF4-FFF2-40B4-BE49-F238E27FC236}">
+                <a16:creationId xmlns:a16="http://schemas.microsoft.com/office/drawing/2014/main" id="{87D712B0-2C2B-1E47-BD90-35BD482B2100}"/>
+              </a:ext>
+            </a:extLst>
+          </p:cNvPr>
+          <p:cNvSpPr/>
+          <p:nvPr/>
+        </p:nvSpPr>
+        <p:spPr>
+          <a:xfrm>
+            <a:off x="9532354" y="3303327"/>
+            <a:ext cx="918829" cy="621598"/>
+          </a:xfrm>
+          <a:prstGeom prst="rect">
+            <a:avLst/>
+          </a:prstGeom>
+          <a:solidFill>
+            <a:srgbClr val="C55A11">
+              <a:alpha val="50196"/>
+            </a:srgbClr>
+          </a:solidFill>
+        </p:spPr>
+        <p:style>
+          <a:lnRef idx="2">
+            <a:schemeClr val="dk1"/>
+          </a:lnRef>
+          <a:fillRef idx="1">
+            <a:schemeClr val="lt1"/>
+          </a:fillRef>
+          <a:effectRef idx="0">
+            <a:schemeClr val="dk1"/>
+          </a:effectRef>
+          <a:fontRef idx="minor">
+            <a:schemeClr val="dk1"/>
+          </a:fontRef>
+        </p:style>
+        <p:txBody>
+          <a:bodyPr rtlCol="0" anchor="ctr" anchorCtr="0"/>
+          <a:lstStyle/>
+          <a:p>
+            <a:pPr algn="ctr"/>
+            <a:r>
+              <a:rPr lang="en-US" dirty="0"/>
+              <a:t>House2</a:t>
+            </a:r>
+          </a:p>
+        </p:txBody>
+      </p:sp>
+      <p:sp>
+        <p:nvSpPr>
+          <p:cNvPr id="65" name="Rectangle 64">
+            <a:extLst>
+              <a:ext uri="{FF2B5EF4-FFF2-40B4-BE49-F238E27FC236}">
+                <a16:creationId xmlns:a16="http://schemas.microsoft.com/office/drawing/2014/main" id="{4DF30271-CF4E-B44E-8DE8-191BC8860815}"/>
+              </a:ext>
+            </a:extLst>
+          </p:cNvPr>
+          <p:cNvSpPr/>
+          <p:nvPr/>
+        </p:nvSpPr>
+        <p:spPr>
+          <a:xfrm>
+            <a:off x="9215208" y="4553403"/>
+            <a:ext cx="1701322" cy="372544"/>
+          </a:xfrm>
+          <a:prstGeom prst="rect">
+            <a:avLst/>
+          </a:prstGeom>
+          <a:solidFill>
+            <a:srgbClr val="BFBFBF">
+              <a:alpha val="50196"/>
+            </a:srgbClr>
+          </a:solidFill>
+        </p:spPr>
+        <p:style>
+          <a:lnRef idx="2">
+            <a:schemeClr val="dk1"/>
+          </a:lnRef>
+          <a:fillRef idx="1">
+            <a:schemeClr val="lt1"/>
+          </a:fillRef>
+          <a:effectRef idx="0">
+            <a:schemeClr val="dk1"/>
+          </a:effectRef>
+          <a:fontRef idx="minor">
+            <a:schemeClr val="dk1"/>
+          </a:fontRef>
+        </p:style>
+        <p:txBody>
+          <a:bodyPr rtlCol="0" anchor="b" anchorCtr="0"/>
+          <a:lstStyle/>
+          <a:p>
+            <a:pPr algn="ctr"/>
+            <a:r>
+              <a:rPr lang="en-US" dirty="0"/>
+              <a:t>Road</a:t>
+            </a:r>
+          </a:p>
+        </p:txBody>
+      </p:sp>
     </p:spTree>
     <p:extLst>
       <p:ext uri="{BB962C8B-B14F-4D97-AF65-F5344CB8AC3E}">
-        <p14:creationId xmlns:p14="http://schemas.microsoft.com/office/powerpoint/2010/main" val="3729733305"/>
+        <p14:creationId xmlns:p14="http://schemas.microsoft.com/office/powerpoint/2010/main" val="988019430"/>
       </p:ext>
     </p:extLst>
   </p:cSld>
@@ -20514,7 +21294,7 @@
         </p:nvGrpSpPr>
         <p:grpSpPr>
           <a:xfrm>
-            <a:off x="3223987" y="2037403"/>
+            <a:off x="929195" y="2037403"/>
             <a:ext cx="5523046" cy="3556127"/>
             <a:chOff x="3223987" y="2037403"/>
             <a:chExt cx="5523046" cy="3556127"/>
@@ -21903,6 +22683,266 @@
           </p:txBody>
         </p:sp>
       </p:grpSp>
+      <p:sp>
+        <p:nvSpPr>
+          <p:cNvPr id="36" name="Rectangle 35">
+            <a:extLst>
+              <a:ext uri="{FF2B5EF4-FFF2-40B4-BE49-F238E27FC236}">
+                <a16:creationId xmlns:a16="http://schemas.microsoft.com/office/drawing/2014/main" id="{B5893BF5-E4C6-DD45-988C-DD3566DEFC03}"/>
+              </a:ext>
+            </a:extLst>
+          </p:cNvPr>
+          <p:cNvSpPr/>
+          <p:nvPr/>
+        </p:nvSpPr>
+        <p:spPr>
+          <a:xfrm>
+            <a:off x="7388010" y="2997940"/>
+            <a:ext cx="1719692" cy="1533099"/>
+          </a:xfrm>
+          <a:prstGeom prst="rect">
+            <a:avLst/>
+          </a:prstGeom>
+          <a:solidFill>
+            <a:srgbClr val="C5E0B4">
+              <a:alpha val="50196"/>
+            </a:srgbClr>
+          </a:solidFill>
+        </p:spPr>
+        <p:style>
+          <a:lnRef idx="2">
+            <a:schemeClr val="dk1"/>
+          </a:lnRef>
+          <a:fillRef idx="1">
+            <a:schemeClr val="lt1"/>
+          </a:fillRef>
+          <a:effectRef idx="0">
+            <a:schemeClr val="dk1"/>
+          </a:effectRef>
+          <a:fontRef idx="minor">
+            <a:schemeClr val="dk1"/>
+          </a:fontRef>
+        </p:style>
+        <p:txBody>
+          <a:bodyPr rtlCol="0" anchor="t" anchorCtr="0"/>
+          <a:lstStyle/>
+          <a:p>
+            <a:pPr algn="ctr"/>
+            <a:r>
+              <a:rPr lang="en-US" dirty="0"/>
+              <a:t>Property1</a:t>
+            </a:r>
+          </a:p>
+        </p:txBody>
+      </p:sp>
+      <p:sp>
+        <p:nvSpPr>
+          <p:cNvPr id="37" name="Rectangle 36">
+            <a:extLst>
+              <a:ext uri="{FF2B5EF4-FFF2-40B4-BE49-F238E27FC236}">
+                <a16:creationId xmlns:a16="http://schemas.microsoft.com/office/drawing/2014/main" id="{73BD0375-8358-B744-937B-9905F90C993B}"/>
+              </a:ext>
+            </a:extLst>
+          </p:cNvPr>
+          <p:cNvSpPr/>
+          <p:nvPr/>
+        </p:nvSpPr>
+        <p:spPr>
+          <a:xfrm>
+            <a:off x="9103423" y="2813303"/>
+            <a:ext cx="1719692" cy="1533099"/>
+          </a:xfrm>
+          <a:prstGeom prst="rect">
+            <a:avLst/>
+          </a:prstGeom>
+          <a:solidFill>
+            <a:srgbClr val="F4B183">
+              <a:alpha val="50196"/>
+            </a:srgbClr>
+          </a:solidFill>
+        </p:spPr>
+        <p:style>
+          <a:lnRef idx="2">
+            <a:schemeClr val="dk1"/>
+          </a:lnRef>
+          <a:fillRef idx="1">
+            <a:schemeClr val="lt1"/>
+          </a:fillRef>
+          <a:effectRef idx="0">
+            <a:schemeClr val="dk1"/>
+          </a:effectRef>
+          <a:fontRef idx="minor">
+            <a:schemeClr val="dk1"/>
+          </a:fontRef>
+        </p:style>
+        <p:txBody>
+          <a:bodyPr rtlCol="0" anchor="t" anchorCtr="0"/>
+          <a:lstStyle/>
+          <a:p>
+            <a:pPr algn="ctr"/>
+            <a:r>
+              <a:rPr lang="en-US" dirty="0"/>
+              <a:t>Property2</a:t>
+            </a:r>
+          </a:p>
+        </p:txBody>
+      </p:sp>
+      <p:sp>
+        <p:nvSpPr>
+          <p:cNvPr id="39" name="Rectangle 38">
+            <a:extLst>
+              <a:ext uri="{FF2B5EF4-FFF2-40B4-BE49-F238E27FC236}">
+                <a16:creationId xmlns:a16="http://schemas.microsoft.com/office/drawing/2014/main" id="{687C61AF-E940-D84B-B6F6-9ACC590BF4CE}"/>
+              </a:ext>
+            </a:extLst>
+          </p:cNvPr>
+          <p:cNvSpPr/>
+          <p:nvPr/>
+        </p:nvSpPr>
+        <p:spPr>
+          <a:xfrm>
+            <a:off x="7398629" y="3450985"/>
+            <a:ext cx="918829" cy="621598"/>
+          </a:xfrm>
+          <a:prstGeom prst="rect">
+            <a:avLst/>
+          </a:prstGeom>
+          <a:solidFill>
+            <a:srgbClr val="548235">
+              <a:alpha val="50196"/>
+            </a:srgbClr>
+          </a:solidFill>
+        </p:spPr>
+        <p:style>
+          <a:lnRef idx="2">
+            <a:schemeClr val="dk1"/>
+          </a:lnRef>
+          <a:fillRef idx="1">
+            <a:schemeClr val="lt1"/>
+          </a:fillRef>
+          <a:effectRef idx="0">
+            <a:schemeClr val="dk1"/>
+          </a:effectRef>
+          <a:fontRef idx="minor">
+            <a:schemeClr val="dk1"/>
+          </a:fontRef>
+        </p:style>
+        <p:txBody>
+          <a:bodyPr rtlCol="0" anchor="ctr" anchorCtr="0"/>
+          <a:lstStyle/>
+          <a:p>
+            <a:pPr algn="ctr"/>
+            <a:r>
+              <a:rPr lang="en-US" dirty="0"/>
+              <a:t>House1</a:t>
+            </a:r>
+          </a:p>
+        </p:txBody>
+      </p:sp>
+      <p:sp>
+        <p:nvSpPr>
+          <p:cNvPr id="40" name="Rectangle 39">
+            <a:extLst>
+              <a:ext uri="{FF2B5EF4-FFF2-40B4-BE49-F238E27FC236}">
+                <a16:creationId xmlns:a16="http://schemas.microsoft.com/office/drawing/2014/main" id="{933E5895-70D6-934D-A8DE-510B62917618}"/>
+              </a:ext>
+            </a:extLst>
+          </p:cNvPr>
+          <p:cNvSpPr/>
+          <p:nvPr/>
+        </p:nvSpPr>
+        <p:spPr>
+          <a:xfrm>
+            <a:off x="9532354" y="3303327"/>
+            <a:ext cx="918829" cy="621598"/>
+          </a:xfrm>
+          <a:prstGeom prst="rect">
+            <a:avLst/>
+          </a:prstGeom>
+          <a:solidFill>
+            <a:srgbClr val="C55A11">
+              <a:alpha val="50196"/>
+            </a:srgbClr>
+          </a:solidFill>
+        </p:spPr>
+        <p:style>
+          <a:lnRef idx="2">
+            <a:schemeClr val="dk1"/>
+          </a:lnRef>
+          <a:fillRef idx="1">
+            <a:schemeClr val="lt1"/>
+          </a:fillRef>
+          <a:effectRef idx="0">
+            <a:schemeClr val="dk1"/>
+          </a:effectRef>
+          <a:fontRef idx="minor">
+            <a:schemeClr val="dk1"/>
+          </a:fontRef>
+        </p:style>
+        <p:txBody>
+          <a:bodyPr rtlCol="0" anchor="ctr" anchorCtr="0"/>
+          <a:lstStyle/>
+          <a:p>
+            <a:pPr algn="ctr"/>
+            <a:r>
+              <a:rPr lang="en-US" dirty="0"/>
+              <a:t>House2</a:t>
+            </a:r>
+          </a:p>
+        </p:txBody>
+      </p:sp>
+      <p:sp>
+        <p:nvSpPr>
+          <p:cNvPr id="43" name="Rectangle 42">
+            <a:extLst>
+              <a:ext uri="{FF2B5EF4-FFF2-40B4-BE49-F238E27FC236}">
+                <a16:creationId xmlns:a16="http://schemas.microsoft.com/office/drawing/2014/main" id="{0E9946F0-5F28-4742-A80F-F4550A851030}"/>
+              </a:ext>
+            </a:extLst>
+          </p:cNvPr>
+          <p:cNvSpPr/>
+          <p:nvPr/>
+        </p:nvSpPr>
+        <p:spPr>
+          <a:xfrm>
+            <a:off x="6975231" y="4220240"/>
+            <a:ext cx="4378569" cy="621598"/>
+          </a:xfrm>
+          <a:prstGeom prst="rect">
+            <a:avLst/>
+          </a:prstGeom>
+          <a:solidFill>
+            <a:srgbClr val="BFBFBF">
+              <a:alpha val="50196"/>
+            </a:srgbClr>
+          </a:solidFill>
+        </p:spPr>
+        <p:style>
+          <a:lnRef idx="2">
+            <a:schemeClr val="dk1"/>
+          </a:lnRef>
+          <a:fillRef idx="1">
+            <a:schemeClr val="lt1"/>
+          </a:fillRef>
+          <a:effectRef idx="0">
+            <a:schemeClr val="dk1"/>
+          </a:effectRef>
+          <a:fontRef idx="minor">
+            <a:schemeClr val="dk1"/>
+          </a:fontRef>
+        </p:style>
+        <p:txBody>
+          <a:bodyPr rtlCol="0" anchor="b" anchorCtr="0"/>
+          <a:lstStyle/>
+          <a:p>
+            <a:pPr algn="ctr"/>
+            <a:r>
+              <a:rPr lang="en-US" dirty="0"/>
+              <a:t>Road</a:t>
+            </a:r>
+          </a:p>
+        </p:txBody>
+      </p:sp>
     </p:spTree>
     <p:extLst>
       <p:ext uri="{BB962C8B-B14F-4D97-AF65-F5344CB8AC3E}">

</xml_diff>

<commit_message>
Corrections to figures in PPT file
</commit_message>
<xml_diff>
--- a/Misc/wikipedia_rcc8_figure.pptx
+++ b/Misc/wikipedia_rcc8_figure.pptx
@@ -273,7 +273,7 @@
           <a:p>
             <a:fld id="{878EFCAF-C503-664D-A7D0-AD00AF0F31C4}" type="datetimeFigureOut">
               <a:rPr lang="en-US" smtClean="0"/>
-              <a:t>12/16/20</a:t>
+              <a:t>12/17/20</a:t>
             </a:fld>
             <a:endParaRPr lang="en-US"/>
           </a:p>
@@ -471,7 +471,7 @@
           <a:p>
             <a:fld id="{878EFCAF-C503-664D-A7D0-AD00AF0F31C4}" type="datetimeFigureOut">
               <a:rPr lang="en-US" smtClean="0"/>
-              <a:t>12/16/20</a:t>
+              <a:t>12/17/20</a:t>
             </a:fld>
             <a:endParaRPr lang="en-US"/>
           </a:p>
@@ -679,7 +679,7 @@
           <a:p>
             <a:fld id="{878EFCAF-C503-664D-A7D0-AD00AF0F31C4}" type="datetimeFigureOut">
               <a:rPr lang="en-US" smtClean="0"/>
-              <a:t>12/16/20</a:t>
+              <a:t>12/17/20</a:t>
             </a:fld>
             <a:endParaRPr lang="en-US"/>
           </a:p>
@@ -877,7 +877,7 @@
           <a:p>
             <a:fld id="{878EFCAF-C503-664D-A7D0-AD00AF0F31C4}" type="datetimeFigureOut">
               <a:rPr lang="en-US" smtClean="0"/>
-              <a:t>12/16/20</a:t>
+              <a:t>12/17/20</a:t>
             </a:fld>
             <a:endParaRPr lang="en-US"/>
           </a:p>
@@ -1152,7 +1152,7 @@
           <a:p>
             <a:fld id="{878EFCAF-C503-664D-A7D0-AD00AF0F31C4}" type="datetimeFigureOut">
               <a:rPr lang="en-US" smtClean="0"/>
-              <a:t>12/16/20</a:t>
+              <a:t>12/17/20</a:t>
             </a:fld>
             <a:endParaRPr lang="en-US"/>
           </a:p>
@@ -1417,7 +1417,7 @@
           <a:p>
             <a:fld id="{878EFCAF-C503-664D-A7D0-AD00AF0F31C4}" type="datetimeFigureOut">
               <a:rPr lang="en-US" smtClean="0"/>
-              <a:t>12/16/20</a:t>
+              <a:t>12/17/20</a:t>
             </a:fld>
             <a:endParaRPr lang="en-US"/>
           </a:p>
@@ -1829,7 +1829,7 @@
           <a:p>
             <a:fld id="{878EFCAF-C503-664D-A7D0-AD00AF0F31C4}" type="datetimeFigureOut">
               <a:rPr lang="en-US" smtClean="0"/>
-              <a:t>12/16/20</a:t>
+              <a:t>12/17/20</a:t>
             </a:fld>
             <a:endParaRPr lang="en-US"/>
           </a:p>
@@ -1970,7 +1970,7 @@
           <a:p>
             <a:fld id="{878EFCAF-C503-664D-A7D0-AD00AF0F31C4}" type="datetimeFigureOut">
               <a:rPr lang="en-US" smtClean="0"/>
-              <a:t>12/16/20</a:t>
+              <a:t>12/17/20</a:t>
             </a:fld>
             <a:endParaRPr lang="en-US"/>
           </a:p>
@@ -2083,7 +2083,7 @@
           <a:p>
             <a:fld id="{878EFCAF-C503-664D-A7D0-AD00AF0F31C4}" type="datetimeFigureOut">
               <a:rPr lang="en-US" smtClean="0"/>
-              <a:t>12/16/20</a:t>
+              <a:t>12/17/20</a:t>
             </a:fld>
             <a:endParaRPr lang="en-US"/>
           </a:p>
@@ -2394,7 +2394,7 @@
           <a:p>
             <a:fld id="{878EFCAF-C503-664D-A7D0-AD00AF0F31C4}" type="datetimeFigureOut">
               <a:rPr lang="en-US" smtClean="0"/>
-              <a:t>12/16/20</a:t>
+              <a:t>12/17/20</a:t>
             </a:fld>
             <a:endParaRPr lang="en-US"/>
           </a:p>
@@ -2682,7 +2682,7 @@
           <a:p>
             <a:fld id="{878EFCAF-C503-664D-A7D0-AD00AF0F31C4}" type="datetimeFigureOut">
               <a:rPr lang="en-US" smtClean="0"/>
-              <a:t>12/16/20</a:t>
+              <a:t>12/17/20</a:t>
             </a:fld>
             <a:endParaRPr lang="en-US"/>
           </a:p>
@@ -2923,7 +2923,7 @@
           <a:p>
             <a:fld id="{878EFCAF-C503-664D-A7D0-AD00AF0F31C4}" type="datetimeFigureOut">
               <a:rPr lang="en-US" smtClean="0"/>
-              <a:t>12/16/20</a:t>
+              <a:t>12/17/20</a:t>
             </a:fld>
             <a:endParaRPr lang="en-US"/>
           </a:p>
@@ -17563,7 +17563,7 @@
         <p:spPr>
           <a:xfrm>
             <a:off x="9103423" y="2813303"/>
-            <a:ext cx="1719692" cy="1533099"/>
+            <a:ext cx="1719692" cy="1597709"/>
           </a:xfrm>
           <a:prstGeom prst="rect">
             <a:avLst/>
@@ -17614,7 +17614,7 @@
         </p:nvSpPr>
         <p:spPr>
           <a:xfrm>
-            <a:off x="8184593" y="3487964"/>
+            <a:off x="8184593" y="3593064"/>
             <a:ext cx="918829" cy="621598"/>
           </a:xfrm>
           <a:prstGeom prst="rect">
@@ -17666,7 +17666,7 @@
         </p:nvSpPr>
         <p:spPr>
           <a:xfrm>
-            <a:off x="9532354" y="3303327"/>
+            <a:off x="9532354" y="3597613"/>
             <a:ext cx="918829" cy="621598"/>
           </a:xfrm>
           <a:prstGeom prst="rect">
@@ -17802,7 +17802,12 @@
             <p:ph type="title"/>
           </p:nvPr>
         </p:nvSpPr>
-        <p:spPr/>
+        <p:spPr>
+          <a:xfrm>
+            <a:off x="827690" y="365125"/>
+            <a:ext cx="10515600" cy="1325563"/>
+          </a:xfrm>
+        </p:spPr>
         <p:txBody>
           <a:bodyPr/>
           <a:lstStyle/>
@@ -19227,10 +19232,10 @@
       </p:grpSp>
       <p:sp>
         <p:nvSpPr>
-          <p:cNvPr id="64" name="Rectangle 63">
+          <p:cNvPr id="43" name="Rectangle 42">
             <a:extLst>
               <a:ext uri="{FF2B5EF4-FFF2-40B4-BE49-F238E27FC236}">
-                <a16:creationId xmlns:a16="http://schemas.microsoft.com/office/drawing/2014/main" id="{7E5D5FE3-189C-9A40-BCCE-D6D47D93A4CE}"/>
+                <a16:creationId xmlns:a16="http://schemas.microsoft.com/office/drawing/2014/main" id="{CEA47DF5-166B-4C4F-B675-B33D49919597}"/>
               </a:ext>
             </a:extLst>
           </p:cNvPr>
@@ -19239,7 +19244,7 @@
         </p:nvSpPr>
         <p:spPr>
           <a:xfrm>
-            <a:off x="7388010" y="2690213"/>
+            <a:off x="7388010" y="2682631"/>
             <a:ext cx="1719692" cy="1533099"/>
           </a:xfrm>
           <a:prstGeom prst="rect">
@@ -19279,10 +19284,10 @@
       </p:sp>
       <p:sp>
         <p:nvSpPr>
-          <p:cNvPr id="65" name="Rectangle 64">
+          <p:cNvPr id="49" name="Rectangle 48">
             <a:extLst>
               <a:ext uri="{FF2B5EF4-FFF2-40B4-BE49-F238E27FC236}">
-                <a16:creationId xmlns:a16="http://schemas.microsoft.com/office/drawing/2014/main" id="{E34BF133-DCEE-2442-B05E-B8F99EE9AF9D}"/>
+                <a16:creationId xmlns:a16="http://schemas.microsoft.com/office/drawing/2014/main" id="{F5BCC235-08CC-9445-B3F4-DD858C1DB48D}"/>
               </a:ext>
             </a:extLst>
           </p:cNvPr>
@@ -19292,7 +19297,7 @@
         <p:spPr>
           <a:xfrm>
             <a:off x="9103423" y="2813303"/>
-            <a:ext cx="1719692" cy="1533099"/>
+            <a:ext cx="1719692" cy="1597709"/>
           </a:xfrm>
           <a:prstGeom prst="rect">
             <a:avLst/>
@@ -19331,10 +19336,10 @@
       </p:sp>
       <p:sp>
         <p:nvSpPr>
-          <p:cNvPr id="66" name="Rectangle 65">
+          <p:cNvPr id="59" name="Rectangle 58">
             <a:extLst>
               <a:ext uri="{FF2B5EF4-FFF2-40B4-BE49-F238E27FC236}">
-                <a16:creationId xmlns:a16="http://schemas.microsoft.com/office/drawing/2014/main" id="{FBA9EE22-BAEB-B84E-9F19-7F524D317FEE}"/>
+                <a16:creationId xmlns:a16="http://schemas.microsoft.com/office/drawing/2014/main" id="{8B1AC8D1-FB29-1741-AE9B-D16267A5430F}"/>
               </a:ext>
             </a:extLst>
           </p:cNvPr>
@@ -19343,7 +19348,7 @@
         </p:nvSpPr>
         <p:spPr>
           <a:xfrm>
-            <a:off x="8184593" y="3180237"/>
+            <a:off x="8184593" y="3277755"/>
             <a:ext cx="918829" cy="621598"/>
           </a:xfrm>
           <a:prstGeom prst="rect">
@@ -19383,10 +19388,10 @@
       </p:sp>
       <p:sp>
         <p:nvSpPr>
-          <p:cNvPr id="67" name="Rectangle 66">
+          <p:cNvPr id="61" name="Rectangle 60">
             <a:extLst>
               <a:ext uri="{FF2B5EF4-FFF2-40B4-BE49-F238E27FC236}">
-                <a16:creationId xmlns:a16="http://schemas.microsoft.com/office/drawing/2014/main" id="{49760F91-852F-8647-A5E4-F0BD39DA8058}"/>
+                <a16:creationId xmlns:a16="http://schemas.microsoft.com/office/drawing/2014/main" id="{31D067F6-F6F0-E14C-BD78-A9E3FEC738FF}"/>
               </a:ext>
             </a:extLst>
           </p:cNvPr>
@@ -19395,7 +19400,7 @@
         </p:nvSpPr>
         <p:spPr>
           <a:xfrm>
-            <a:off x="9532354" y="3303327"/>
+            <a:off x="9532354" y="3597613"/>
             <a:ext cx="918829" cy="621598"/>
           </a:xfrm>
           <a:prstGeom prst="rect">
@@ -19435,10 +19440,10 @@
       </p:sp>
       <p:sp>
         <p:nvSpPr>
-          <p:cNvPr id="68" name="Rectangle 67">
+          <p:cNvPr id="62" name="Rectangle 61">
             <a:extLst>
               <a:ext uri="{FF2B5EF4-FFF2-40B4-BE49-F238E27FC236}">
-                <a16:creationId xmlns:a16="http://schemas.microsoft.com/office/drawing/2014/main" id="{0B85FE94-9BF3-654C-998C-457D05AEC397}"/>
+                <a16:creationId xmlns:a16="http://schemas.microsoft.com/office/drawing/2014/main" id="{7F7BBB9B-751D-F145-9EA6-2ED6D5D3232B}"/>
               </a:ext>
             </a:extLst>
           </p:cNvPr>
@@ -20969,7 +20974,7 @@
         <p:spPr>
           <a:xfrm>
             <a:off x="7388010" y="2997940"/>
-            <a:ext cx="1719692" cy="1533099"/>
+            <a:ext cx="1719692" cy="2155717"/>
           </a:xfrm>
           <a:prstGeom prst="rect">
             <a:avLst/>
@@ -21176,7 +21181,7 @@
         </p:nvSpPr>
         <p:spPr>
           <a:xfrm>
-            <a:off x="9215208" y="4553403"/>
+            <a:off x="9103422" y="4438123"/>
             <a:ext cx="1701322" cy="372544"/>
           </a:xfrm>
           <a:prstGeom prst="rect">

</xml_diff>